<commit_message>
Updated presentation with Connor and Dan's slides
</commit_message>
<xml_diff>
--- a/Final Documents/Final Presentation.pptx
+++ b/Final Documents/Final Presentation.pptx
@@ -5,21 +5,24 @@
     <p:sldMasterId id="2147483660" r:id="rId1"/>
   </p:sldMasterIdLst>
   <p:notesMasterIdLst>
-    <p:notesMasterId r:id="rId14"/>
+    <p:notesMasterId r:id="rId17"/>
   </p:notesMasterIdLst>
   <p:sldIdLst>
     <p:sldId id="256" r:id="rId2"/>
     <p:sldId id="264" r:id="rId3"/>
     <p:sldId id="257" r:id="rId4"/>
-    <p:sldId id="265" r:id="rId5"/>
-    <p:sldId id="258" r:id="rId6"/>
-    <p:sldId id="268" r:id="rId7"/>
-    <p:sldId id="269" r:id="rId8"/>
-    <p:sldId id="266" r:id="rId9"/>
-    <p:sldId id="259" r:id="rId10"/>
-    <p:sldId id="263" r:id="rId11"/>
-    <p:sldId id="267" r:id="rId12"/>
-    <p:sldId id="261" r:id="rId13"/>
+    <p:sldId id="258" r:id="rId5"/>
+    <p:sldId id="268" r:id="rId6"/>
+    <p:sldId id="269" r:id="rId7"/>
+    <p:sldId id="259" r:id="rId8"/>
+    <p:sldId id="273" r:id="rId9"/>
+    <p:sldId id="274" r:id="rId10"/>
+    <p:sldId id="270" r:id="rId11"/>
+    <p:sldId id="271" r:id="rId12"/>
+    <p:sldId id="272" r:id="rId13"/>
+    <p:sldId id="275" r:id="rId14"/>
+    <p:sldId id="267" r:id="rId15"/>
+    <p:sldId id="261" r:id="rId16"/>
   </p:sldIdLst>
   <p:sldSz cx="9144000" cy="6858000" type="screen4x3"/>
   <p:notesSz cx="6858000" cy="9144000"/>
@@ -219,7 +222,7 @@
           <a:p>
             <a:fld id="{3054C299-8359-5B4D-8FA7-E9A587887A0D}" type="datetimeFigureOut">
               <a:rPr lang="en-US" smtClean="0"/>
-              <a:t>12/2/2015</a:t>
+              <a:t>12/2/15</a:t>
             </a:fld>
             <a:endParaRPr lang="en-US"/>
           </a:p>
@@ -732,7 +735,7 @@
           <a:p>
             <a:fld id="{05332D8B-7B6C-A54D-BAC6-226B3ACA1459}" type="slidenum">
               <a:rPr lang="en-US" smtClean="0"/>
-              <a:t>5</a:t>
+              <a:t>4</a:t>
             </a:fld>
             <a:endParaRPr lang="en-US"/>
           </a:p>
@@ -796,47 +799,17 @@
           <a:lstStyle/>
           <a:p>
             <a:r>
-              <a:rPr lang="en-US" dirty="0" smtClean="0"/>
-              <a:t>Need to update this:</a:t>
-            </a:r>
-          </a:p>
-          <a:p>
-            <a:r>
-              <a:rPr lang="en-US" dirty="0" smtClean="0"/>
-              <a:t>Updated screenshot to</a:t>
-            </a:r>
-            <a:r>
               <a:rPr lang="en-US" baseline="0" dirty="0" smtClean="0"/>
-              <a:t> replace hello world</a:t>
-            </a:r>
-          </a:p>
-          <a:p>
+              <a:t>Need to add some pictures of the project- </a:t>
+            </a:r>
+            <a:r>
+              <a:rPr lang="en-US" baseline="0" dirty="0" err="1" smtClean="0"/>
+              <a:t>Rpi</a:t>
+            </a:r>
             <a:r>
               <a:rPr lang="en-US" baseline="0" dirty="0" smtClean="0"/>
-              <a:t>Updated login screenshot</a:t>
-            </a:r>
-            <a:endParaRPr lang="en-US" dirty="0" smtClean="0"/>
-          </a:p>
-          <a:p>
-            <a:r>
-              <a:rPr lang="en-US" dirty="0" smtClean="0"/>
-              <a:t>Update</a:t>
-            </a:r>
-            <a:r>
-              <a:rPr lang="en-US" baseline="0" dirty="0" smtClean="0"/>
-              <a:t> frameworks used</a:t>
-            </a:r>
-          </a:p>
-          <a:p>
-            <a:r>
-              <a:rPr lang="en-US" baseline="0" dirty="0" smtClean="0"/>
-              <a:t>Update software flowchart (mostly </a:t>
-            </a:r>
-            <a:r>
-              <a:rPr lang="en-US" baseline="0" smtClean="0"/>
-              <a:t>the backend)</a:t>
-            </a:r>
-            <a:endParaRPr lang="en-US" dirty="0"/>
+              <a:t>, node fully set up, maybe screenshots of web UI?</a:t>
+            </a:r>
           </a:p>
         </p:txBody>
       </p:sp>
@@ -857,7 +830,7 @@
           <a:p>
             <a:fld id="{05332D8B-7B6C-A54D-BAC6-226B3ACA1459}" type="slidenum">
               <a:rPr lang="en-US" smtClean="0"/>
-              <a:t>8</a:t>
+              <a:t>7</a:t>
             </a:fld>
             <a:endParaRPr lang="en-US"/>
           </a:p>
@@ -866,7 +839,7 @@
     </p:spTree>
     <p:extLst>
       <p:ext uri="{BB962C8B-B14F-4D97-AF65-F5344CB8AC3E}">
-        <p14:creationId xmlns:p14="http://schemas.microsoft.com/office/powerpoint/2010/main" val="3340116549"/>
+        <p14:creationId xmlns:p14="http://schemas.microsoft.com/office/powerpoint/2010/main" val="282400902"/>
       </p:ext>
     </p:extLst>
   </p:cSld>
@@ -920,18 +893,7 @@
           <a:bodyPr/>
           <a:lstStyle/>
           <a:p>
-            <a:r>
-              <a:rPr lang="en-US" baseline="0" dirty="0" smtClean="0"/>
-              <a:t>Need to add some pictures of the project- </a:t>
-            </a:r>
-            <a:r>
-              <a:rPr lang="en-US" baseline="0" dirty="0" err="1" smtClean="0"/>
-              <a:t>Rpi</a:t>
-            </a:r>
-            <a:r>
-              <a:rPr lang="en-US" baseline="0" dirty="0" smtClean="0"/>
-              <a:t>, node fully set up, maybe screenshots of web UI?</a:t>
-            </a:r>
+            <a:endParaRPr lang="en-US" dirty="0"/>
           </a:p>
         </p:txBody>
       </p:sp>
@@ -961,7 +923,7 @@
     </p:spTree>
     <p:extLst>
       <p:ext uri="{BB962C8B-B14F-4D97-AF65-F5344CB8AC3E}">
-        <p14:creationId xmlns:p14="http://schemas.microsoft.com/office/powerpoint/2010/main" val="282400902"/>
+        <p14:creationId xmlns:p14="http://schemas.microsoft.com/office/powerpoint/2010/main" val="1497375528"/>
       </p:ext>
     </p:extLst>
   </p:cSld>
@@ -1036,7 +998,7 @@
           <a:p>
             <a:fld id="{05332D8B-7B6C-A54D-BAC6-226B3ACA1459}" type="slidenum">
               <a:rPr lang="en-US" smtClean="0"/>
-              <a:t>10</a:t>
+              <a:t>14</a:t>
             </a:fld>
             <a:endParaRPr lang="en-US"/>
           </a:p>
@@ -1045,7 +1007,7 @@
     </p:spTree>
     <p:extLst>
       <p:ext uri="{BB962C8B-B14F-4D97-AF65-F5344CB8AC3E}">
-        <p14:creationId xmlns:p14="http://schemas.microsoft.com/office/powerpoint/2010/main" val="30328140"/>
+        <p14:creationId xmlns:p14="http://schemas.microsoft.com/office/powerpoint/2010/main" val="3647391457"/>
       </p:ext>
     </p:extLst>
   </p:cSld>
@@ -1120,91 +1082,7 @@
           <a:p>
             <a:fld id="{05332D8B-7B6C-A54D-BAC6-226B3ACA1459}" type="slidenum">
               <a:rPr lang="en-US" smtClean="0"/>
-              <a:t>11</a:t>
-            </a:fld>
-            <a:endParaRPr lang="en-US"/>
-          </a:p>
-        </p:txBody>
-      </p:sp>
-    </p:spTree>
-    <p:extLst>
-      <p:ext uri="{BB962C8B-B14F-4D97-AF65-F5344CB8AC3E}">
-        <p14:creationId xmlns:p14="http://schemas.microsoft.com/office/powerpoint/2010/main" val="3647391457"/>
-      </p:ext>
-    </p:extLst>
-  </p:cSld>
-  <p:clrMapOvr>
-    <a:masterClrMapping/>
-  </p:clrMapOvr>
-</p:notes>
-</file>
-
-<file path=ppt/notesSlides/notesSlide8.xml><?xml version="1.0" encoding="utf-8"?>
-<p:notes xmlns:a="http://schemas.openxmlformats.org/drawingml/2006/main" xmlns:r="http://schemas.openxmlformats.org/officeDocument/2006/relationships" xmlns:p="http://schemas.openxmlformats.org/presentationml/2006/main">
-  <p:cSld>
-    <p:spTree>
-      <p:nvGrpSpPr>
-        <p:cNvPr id="1" name=""/>
-        <p:cNvGrpSpPr/>
-        <p:nvPr/>
-      </p:nvGrpSpPr>
-      <p:grpSpPr>
-        <a:xfrm>
-          <a:off x="0" y="0"/>
-          <a:ext cx="0" cy="0"/>
-          <a:chOff x="0" y="0"/>
-          <a:chExt cx="0" cy="0"/>
-        </a:xfrm>
-      </p:grpSpPr>
-      <p:sp>
-        <p:nvSpPr>
-          <p:cNvPr id="2" name="Slide Image Placeholder 1"/>
-          <p:cNvSpPr>
-            <a:spLocks noGrp="1" noRot="1" noChangeAspect="1"/>
-          </p:cNvSpPr>
-          <p:nvPr>
-            <p:ph type="sldImg"/>
-          </p:nvPr>
-        </p:nvSpPr>
-        <p:spPr/>
-      </p:sp>
-      <p:sp>
-        <p:nvSpPr>
-          <p:cNvPr id="3" name="Notes Placeholder 2"/>
-          <p:cNvSpPr>
-            <a:spLocks noGrp="1"/>
-          </p:cNvSpPr>
-          <p:nvPr>
-            <p:ph type="body" idx="1"/>
-          </p:nvPr>
-        </p:nvSpPr>
-        <p:spPr/>
-        <p:txBody>
-          <a:bodyPr/>
-          <a:lstStyle/>
-          <a:p>
-            <a:endParaRPr lang="en-US" dirty="0"/>
-          </a:p>
-        </p:txBody>
-      </p:sp>
-      <p:sp>
-        <p:nvSpPr>
-          <p:cNvPr id="4" name="Slide Number Placeholder 3"/>
-          <p:cNvSpPr>
-            <a:spLocks noGrp="1"/>
-          </p:cNvSpPr>
-          <p:nvPr>
-            <p:ph type="sldNum" sz="quarter" idx="10"/>
-          </p:nvPr>
-        </p:nvSpPr>
-        <p:spPr/>
-        <p:txBody>
-          <a:bodyPr/>
-          <a:lstStyle/>
-          <a:p>
-            <a:fld id="{05332D8B-7B6C-A54D-BAC6-226B3ACA1459}" type="slidenum">
-              <a:rPr lang="en-US" smtClean="0"/>
-              <a:t>12</a:t>
+              <a:t>15</a:t>
             </a:fld>
             <a:endParaRPr lang="en-US"/>
           </a:p>
@@ -1444,7 +1322,7 @@
           <a:p>
             <a:fld id="{651A0C47-018D-4460-B945-BFF7981B6CA6}" type="datetimeFigureOut">
               <a:rPr lang="en-US" smtClean="0"/>
-              <a:t>12/2/2015</a:t>
+              <a:t>12/2/15</a:t>
             </a:fld>
             <a:endParaRPr lang="en-US"/>
           </a:p>
@@ -1776,7 +1654,7 @@
           <a:p>
             <a:fld id="{651A0C47-018D-4460-B945-BFF7981B6CA6}" type="datetimeFigureOut">
               <a:rPr lang="en-US" smtClean="0"/>
-              <a:t>12/2/2015</a:t>
+              <a:t>12/2/15</a:t>
             </a:fld>
             <a:endParaRPr lang="en-US"/>
           </a:p>
@@ -2108,7 +1986,7 @@
           <a:p>
             <a:fld id="{651A0C47-018D-4460-B945-BFF7981B6CA6}" type="datetimeFigureOut">
               <a:rPr lang="en-US" smtClean="0"/>
-              <a:t>12/2/2015</a:t>
+              <a:t>12/2/15</a:t>
             </a:fld>
             <a:endParaRPr lang="en-US"/>
           </a:p>
@@ -2440,7 +2318,7 @@
           <a:p>
             <a:fld id="{651A0C47-018D-4460-B945-BFF7981B6CA6}" type="datetimeFigureOut">
               <a:rPr lang="en-US" smtClean="0"/>
-              <a:t>12/2/2015</a:t>
+              <a:t>12/2/15</a:t>
             </a:fld>
             <a:endParaRPr lang="en-US"/>
           </a:p>
@@ -3129,7 +3007,7 @@
           <a:p>
             <a:fld id="{651A0C47-018D-4460-B945-BFF7981B6CA6}" type="datetimeFigureOut">
               <a:rPr lang="en-US" smtClean="0"/>
-              <a:t>12/2/2015</a:t>
+              <a:t>12/2/15</a:t>
             </a:fld>
             <a:endParaRPr lang="en-US"/>
           </a:p>
@@ -3308,7 +3186,7 @@
           <a:p>
             <a:fld id="{651A0C47-018D-4460-B945-BFF7981B6CA6}" type="datetimeFigureOut">
               <a:rPr lang="en-US" smtClean="0"/>
-              <a:t>12/2/2015</a:t>
+              <a:t>12/2/15</a:t>
             </a:fld>
             <a:endParaRPr lang="en-US"/>
           </a:p>
@@ -3482,7 +3360,7 @@
           <a:p>
             <a:fld id="{651A0C47-018D-4460-B945-BFF7981B6CA6}" type="datetimeFigureOut">
               <a:rPr lang="en-US" smtClean="0"/>
-              <a:t>12/2/2015</a:t>
+              <a:t>12/2/15</a:t>
             </a:fld>
             <a:endParaRPr lang="en-US"/>
           </a:p>
@@ -3730,7 +3608,7 @@
           <a:p>
             <a:fld id="{651A0C47-018D-4460-B945-BFF7981B6CA6}" type="datetimeFigureOut">
               <a:rPr lang="en-US" smtClean="0"/>
-              <a:t>12/2/2015</a:t>
+              <a:t>12/2/15</a:t>
             </a:fld>
             <a:endParaRPr lang="en-US"/>
           </a:p>
@@ -4060,7 +3938,7 @@
           <a:p>
             <a:fld id="{651A0C47-018D-4460-B945-BFF7981B6CA6}" type="datetimeFigureOut">
               <a:rPr lang="en-US" smtClean="0"/>
-              <a:t>12/2/2015</a:t>
+              <a:t>12/2/15</a:t>
             </a:fld>
             <a:endParaRPr lang="en-US"/>
           </a:p>
@@ -4352,7 +4230,7 @@
           <a:p>
             <a:fld id="{651A0C47-018D-4460-B945-BFF7981B6CA6}" type="datetimeFigureOut">
               <a:rPr lang="en-US" smtClean="0"/>
-              <a:t>12/2/2015</a:t>
+              <a:t>12/2/15</a:t>
             </a:fld>
             <a:endParaRPr lang="en-US"/>
           </a:p>
@@ -4788,7 +4666,7 @@
           <a:p>
             <a:fld id="{651A0C47-018D-4460-B945-BFF7981B6CA6}" type="datetimeFigureOut">
               <a:rPr lang="en-US" smtClean="0"/>
-              <a:t>12/2/2015</a:t>
+              <a:t>12/2/15</a:t>
             </a:fld>
             <a:endParaRPr lang="en-US"/>
           </a:p>
@@ -4975,7 +4853,7 @@
           <a:p>
             <a:fld id="{651A0C47-018D-4460-B945-BFF7981B6CA6}" type="datetimeFigureOut">
               <a:rPr lang="en-US" smtClean="0"/>
-              <a:t>12/2/2015</a:t>
+              <a:t>12/2/15</a:t>
             </a:fld>
             <a:endParaRPr lang="en-US"/>
           </a:p>
@@ -5065,7 +4943,7 @@
           <a:p>
             <a:fld id="{651A0C47-018D-4460-B945-BFF7981B6CA6}" type="datetimeFigureOut">
               <a:rPr lang="en-US" smtClean="0"/>
-              <a:t>12/2/2015</a:t>
+              <a:t>12/2/15</a:t>
             </a:fld>
             <a:endParaRPr lang="en-US"/>
           </a:p>
@@ -5346,7 +5224,7 @@
           <a:p>
             <a:fld id="{651A0C47-018D-4460-B945-BFF7981B6CA6}" type="datetimeFigureOut">
               <a:rPr lang="en-US" smtClean="0"/>
-              <a:t>12/2/2015</a:t>
+              <a:t>12/2/15</a:t>
             </a:fld>
             <a:endParaRPr lang="en-US"/>
           </a:p>
@@ -5561,7 +5439,7 @@
           <a:p>
             <a:fld id="{651A0C47-018D-4460-B945-BFF7981B6CA6}" type="datetimeFigureOut">
               <a:rPr lang="en-US" smtClean="0"/>
-              <a:t>12/2/2015</a:t>
+              <a:t>12/2/15</a:t>
             </a:fld>
             <a:endParaRPr lang="en-US"/>
           </a:p>
@@ -6238,7 +6116,7 @@
       </p:grpSpPr>
       <p:sp>
         <p:nvSpPr>
-          <p:cNvPr id="2" name="Title 1"/>
+          <p:cNvPr id="186" name="Shape 186"/>
           <p:cNvSpPr>
             <a:spLocks noGrp="1"/>
           </p:cNvSpPr>
@@ -6246,87 +6124,145 @@
             <p:ph type="title"/>
           </p:nvPr>
         </p:nvSpPr>
-        <p:spPr/>
-        <p:txBody>
-          <a:bodyPr>
-            <a:normAutofit fontScale="90000"/>
+        <p:spPr>
+          <a:prstGeom prst="rect">
+            <a:avLst/>
+          </a:prstGeom>
+        </p:spPr>
+        <p:txBody>
+          <a:bodyPr/>
+          <a:lstStyle/>
+          <a:p>
+            <a:r>
+              <a:t>Front End (UI)</a:t>
+            </a:r>
+          </a:p>
+        </p:txBody>
+      </p:sp>
+      <p:pic>
+        <p:nvPicPr>
+          <p:cNvPr id="187" name="2015-12-02-160500_1280x1024_scrot.png"/>
+          <p:cNvPicPr>
+            <a:picLocks noChangeAspect="1"/>
+          </p:cNvPicPr>
+          <p:nvPr/>
+        </p:nvPicPr>
+        <p:blipFill>
+          <a:blip r:embed="rId2">
+            <a:extLst/>
+          </a:blip>
+          <a:stretch>
+            <a:fillRect/>
+          </a:stretch>
+        </p:blipFill>
+        <p:spPr>
+          <a:xfrm>
+            <a:off x="977900" y="254000"/>
+            <a:ext cx="7467600" cy="6350000"/>
+          </a:xfrm>
+          <a:prstGeom prst="rect">
+            <a:avLst/>
+          </a:prstGeom>
+          <a:ln w="12700">
+            <a:miter lim="400000"/>
+          </a:ln>
+        </p:spPr>
+      </p:pic>
+      <p:pic>
+        <p:nvPicPr>
+          <p:cNvPr id="188" name="2015-12-02-160505_1280x1024_scrot.png"/>
+          <p:cNvPicPr>
+            <a:picLocks noChangeAspect="1"/>
+          </p:cNvPicPr>
+          <p:nvPr/>
+        </p:nvPicPr>
+        <p:blipFill>
+          <a:blip r:embed="rId3">
+            <a:extLst/>
+          </a:blip>
+          <a:stretch>
+            <a:fillRect/>
+          </a:stretch>
+        </p:blipFill>
+        <p:spPr>
+          <a:xfrm>
+            <a:off x="704850" y="57150"/>
+            <a:ext cx="7734300" cy="6743700"/>
+          </a:xfrm>
+          <a:prstGeom prst="rect">
+            <a:avLst/>
+          </a:prstGeom>
+          <a:ln w="12700">
+            <a:miter lim="400000"/>
+          </a:ln>
+        </p:spPr>
+      </p:pic>
+      <p:sp>
+        <p:nvSpPr>
+          <p:cNvPr id="189" name="Shape 189"/>
+          <p:cNvSpPr/>
+          <p:nvPr/>
+        </p:nvSpPr>
+        <p:spPr>
+          <a:xfrm>
+            <a:off x="1245053" y="3923030"/>
+            <a:ext cx="2060413" cy="383541"/>
+          </a:xfrm>
+          <a:prstGeom prst="rect">
+            <a:avLst/>
+          </a:prstGeom>
+          <a:ln w="12700">
+            <a:miter lim="400000"/>
+          </a:ln>
+          <a:extLst>
+            <a:ext uri="{C572A759-6A51-4108-AA02-DFA0A04FC94B}">
+              <ma14:wrappingTextBoxFlag xmlns:ma14="http://schemas.microsoft.com/office/mac/drawingml/2011/main" val="1"/>
+            </a:ext>
+          </a:extLst>
+        </p:spPr>
+        <p:txBody>
+          <a:bodyPr wrap="none" lIns="45719" rIns="45719">
+            <a:spAutoFit/>
           </a:bodyPr>
           <a:lstStyle/>
           <a:p>
             <a:r>
-              <a:rPr lang="en-US" dirty="0" smtClean="0"/>
-              <a:t>What makes Nosferatu special</a:t>
-            </a:r>
-            <a:endParaRPr lang="en-US" dirty="0"/>
-          </a:p>
-        </p:txBody>
-      </p:sp>
-      <p:sp>
-        <p:nvSpPr>
-          <p:cNvPr id="3" name="Content Placeholder 2"/>
-          <p:cNvSpPr>
-            <a:spLocks noGrp="1"/>
-          </p:cNvSpPr>
-          <p:nvPr>
-            <p:ph idx="1"/>
-          </p:nvPr>
-        </p:nvSpPr>
-        <p:spPr/>
-        <p:txBody>
-          <a:bodyPr/>
+              <a:t>gorsejoe@gmail.com</a:t>
+            </a:r>
+          </a:p>
+        </p:txBody>
+      </p:sp>
+      <p:sp>
+        <p:nvSpPr>
+          <p:cNvPr id="190" name="Shape 190"/>
+          <p:cNvSpPr/>
+          <p:nvPr/>
+        </p:nvSpPr>
+        <p:spPr>
+          <a:xfrm>
+            <a:off x="1257753" y="4862830"/>
+            <a:ext cx="1475741" cy="383540"/>
+          </a:xfrm>
+          <a:prstGeom prst="rect">
+            <a:avLst/>
+          </a:prstGeom>
+          <a:ln w="12700">
+            <a:miter lim="400000"/>
+          </a:ln>
+          <a:extLst>
+            <a:ext uri="{C572A759-6A51-4108-AA02-DFA0A04FC94B}">
+              <ma14:wrappingTextBoxFlag xmlns:ma14="http://schemas.microsoft.com/office/mac/drawingml/2011/main" val="1"/>
+            </a:ext>
+          </a:extLst>
+        </p:spPr>
+        <p:txBody>
+          <a:bodyPr wrap="none" lIns="45719" rIns="45719">
+            <a:spAutoFit/>
+          </a:bodyPr>
           <a:lstStyle/>
           <a:p>
             <a:r>
-              <a:rPr lang="en-US" dirty="0" smtClean="0"/>
-              <a:t>Compared to Wi-Fi lightbulbs</a:t>
-            </a:r>
-            <a:endParaRPr lang="en-US" dirty="0"/>
-          </a:p>
-          <a:p>
-            <a:pPr lvl="1"/>
-            <a:r>
-              <a:rPr lang="en-US" dirty="0" smtClean="0"/>
-              <a:t>Don’t need to replace an expensive lightbulb whenever it dies</a:t>
-            </a:r>
-          </a:p>
-          <a:p>
-            <a:pPr lvl="1"/>
-            <a:r>
-              <a:rPr lang="en-US" dirty="0" smtClean="0"/>
-              <a:t>More sophisticated and synchronized system/setup</a:t>
-            </a:r>
-          </a:p>
-          <a:p>
-            <a:r>
-              <a:rPr lang="en-US" dirty="0" smtClean="0"/>
-              <a:t>Compared to similar switches (such as the Belkin WeMo)</a:t>
-            </a:r>
-          </a:p>
-          <a:p>
-            <a:pPr lvl="1"/>
-            <a:r>
-              <a:rPr lang="en-US" dirty="0" smtClean="0"/>
-              <a:t>Motion Sensor</a:t>
-            </a:r>
-          </a:p>
-          <a:p>
-            <a:pPr lvl="1"/>
-            <a:r>
-              <a:rPr lang="en-US" dirty="0" smtClean="0"/>
-              <a:t>Rules</a:t>
-            </a:r>
-          </a:p>
-          <a:p>
-            <a:pPr lvl="1"/>
-            <a:r>
-              <a:rPr lang="en-US" dirty="0" smtClean="0"/>
-              <a:t>Web API</a:t>
-            </a:r>
-          </a:p>
-          <a:p>
-            <a:r>
-              <a:rPr lang="en-US" dirty="0" smtClean="0"/>
-              <a:t>Cheaper</a:t>
+              <a:t>************</a:t>
             </a:r>
           </a:p>
         </p:txBody>
@@ -6334,19 +6270,256 @@
     </p:spTree>
     <p:extLst>
       <p:ext uri="{BB962C8B-B14F-4D97-AF65-F5344CB8AC3E}">
-        <p14:creationId xmlns:p14="http://schemas.microsoft.com/office/powerpoint/2010/main" val="3903585292"/>
+        <p14:creationId xmlns:p14="http://schemas.microsoft.com/office/powerpoint/2010/main" val="1184193782"/>
       </p:ext>
     </p:extLst>
   </p:cSld>
   <p:clrMapOvr>
     <a:masterClrMapping/>
   </p:clrMapOvr>
+  <p:transition spd="slow"/>
   <p:timing>
     <p:tnLst>
       <p:par>
-        <p:cTn id="1" dur="indefinite" restart="never" nodeType="tmRoot"/>
+        <p:cTn id="1" dur="indefinite" restart="never" fill="hold" nodeType="tmRoot">
+          <p:childTnLst>
+            <p:seq concurrent="1" prevAc="none" nextAc="seek">
+              <p:cTn id="2" dur="indefinite" fill="hold" nodeType="mainSeq">
+                <p:childTnLst>
+                  <p:par>
+                    <p:cTn id="3" fill="hold">
+                      <p:stCondLst>
+                        <p:cond delay="indefinite"/>
+                      </p:stCondLst>
+                      <p:childTnLst>
+                        <p:par>
+                          <p:cTn id="4" fill="hold">
+                            <p:stCondLst>
+                              <p:cond delay="0"/>
+                            </p:stCondLst>
+                            <p:childTnLst>
+                              <p:par>
+                                <p:cTn id="5" presetID="1" presetClass="entr" presetSubtype="0" fill="hold" grpId="0" nodeType="clickEffect">
+                                  <p:stCondLst>
+                                    <p:cond delay="0"/>
+                                  </p:stCondLst>
+                                  <p:iterate>
+                                    <p:tmAbs val="0"/>
+                                  </p:iterate>
+                                  <p:childTnLst>
+                                    <p:set>
+                                      <p:cBhvr>
+                                        <p:cTn id="6" fill="hold"/>
+                                        <p:tgtEl>
+                                          <p:spTgt spid="187"/>
+                                        </p:tgtEl>
+                                        <p:attrNameLst>
+                                          <p:attrName>style.visibility</p:attrName>
+                                        </p:attrNameLst>
+                                      </p:cBhvr>
+                                      <p:to>
+                                        <p:strVal val="visible"/>
+                                      </p:to>
+                                    </p:set>
+                                  </p:childTnLst>
+                                </p:cTn>
+                              </p:par>
+                            </p:childTnLst>
+                          </p:cTn>
+                        </p:par>
+                      </p:childTnLst>
+                    </p:cTn>
+                  </p:par>
+                  <p:par>
+                    <p:cTn id="7" fill="hold">
+                      <p:stCondLst>
+                        <p:cond delay="indefinite"/>
+                      </p:stCondLst>
+                      <p:childTnLst>
+                        <p:par>
+                          <p:cTn id="8" fill="hold">
+                            <p:stCondLst>
+                              <p:cond delay="0"/>
+                            </p:stCondLst>
+                            <p:childTnLst>
+                              <p:par>
+                                <p:cTn id="9" presetID="1" presetClass="entr" presetSubtype="0" fill="hold" grpId="0" nodeType="clickEffect">
+                                  <p:stCondLst>
+                                    <p:cond delay="0"/>
+                                  </p:stCondLst>
+                                  <p:iterate>
+                                    <p:tmAbs val="0"/>
+                                  </p:iterate>
+                                  <p:childTnLst>
+                                    <p:set>
+                                      <p:cBhvr>
+                                        <p:cTn id="10" fill="hold"/>
+                                        <p:tgtEl>
+                                          <p:spTgt spid="188"/>
+                                        </p:tgtEl>
+                                        <p:attrNameLst>
+                                          <p:attrName>style.visibility</p:attrName>
+                                        </p:attrNameLst>
+                                      </p:cBhvr>
+                                      <p:to>
+                                        <p:strVal val="visible"/>
+                                      </p:to>
+                                    </p:set>
+                                  </p:childTnLst>
+                                </p:cTn>
+                              </p:par>
+                            </p:childTnLst>
+                          </p:cTn>
+                        </p:par>
+                      </p:childTnLst>
+                    </p:cTn>
+                  </p:par>
+                  <p:par>
+                    <p:cTn id="11" fill="hold">
+                      <p:stCondLst>
+                        <p:cond delay="indefinite"/>
+                      </p:stCondLst>
+                      <p:childTnLst>
+                        <p:par>
+                          <p:cTn id="12" fill="hold">
+                            <p:stCondLst>
+                              <p:cond delay="0"/>
+                            </p:stCondLst>
+                            <p:childTnLst>
+                              <p:par>
+                                <p:cTn id="13" presetID="1" presetClass="exit" presetSubtype="0" fill="hold" grpId="1" nodeType="clickEffect">
+                                  <p:stCondLst>
+                                    <p:cond delay="0"/>
+                                  </p:stCondLst>
+                                  <p:iterate>
+                                    <p:tmAbs val="0"/>
+                                  </p:iterate>
+                                  <p:childTnLst>
+                                    <p:set>
+                                      <p:cBhvr>
+                                        <p:cTn id="14" fill="hold">
+                                          <p:stCondLst>
+                                            <p:cond delay="0"/>
+                                          </p:stCondLst>
+                                        </p:cTn>
+                                        <p:tgtEl>
+                                          <p:spTgt spid="188"/>
+                                        </p:tgtEl>
+                                        <p:attrNameLst>
+                                          <p:attrName>style.visibility</p:attrName>
+                                        </p:attrNameLst>
+                                      </p:cBhvr>
+                                      <p:to>
+                                        <p:strVal val="hidden"/>
+                                      </p:to>
+                                    </p:set>
+                                  </p:childTnLst>
+                                </p:cTn>
+                              </p:par>
+                            </p:childTnLst>
+                          </p:cTn>
+                        </p:par>
+                        <p:par>
+                          <p:cTn id="15" fill="hold">
+                            <p:stCondLst>
+                              <p:cond delay="0"/>
+                            </p:stCondLst>
+                            <p:childTnLst>
+                              <p:par>
+                                <p:cTn id="16" presetID="1" presetClass="entr" presetSubtype="0" fill="hold" grpId="0" nodeType="afterEffect">
+                                  <p:stCondLst>
+                                    <p:cond delay="0"/>
+                                  </p:stCondLst>
+                                  <p:iterate>
+                                    <p:tmAbs val="0"/>
+                                  </p:iterate>
+                                  <p:childTnLst>
+                                    <p:set>
+                                      <p:cBhvr>
+                                        <p:cTn id="17" fill="hold"/>
+                                        <p:tgtEl>
+                                          <p:spTgt spid="189"/>
+                                        </p:tgtEl>
+                                        <p:attrNameLst>
+                                          <p:attrName>style.visibility</p:attrName>
+                                        </p:attrNameLst>
+                                      </p:cBhvr>
+                                      <p:to>
+                                        <p:strVal val="visible"/>
+                                      </p:to>
+                                    </p:set>
+                                  </p:childTnLst>
+                                </p:cTn>
+                              </p:par>
+                            </p:childTnLst>
+                          </p:cTn>
+                        </p:par>
+                        <p:par>
+                          <p:cTn id="18" fill="hold">
+                            <p:stCondLst>
+                              <p:cond delay="0"/>
+                            </p:stCondLst>
+                            <p:childTnLst>
+                              <p:par>
+                                <p:cTn id="19" presetID="1" presetClass="entr" presetSubtype="0" fill="hold" grpId="0" nodeType="afterEffect">
+                                  <p:stCondLst>
+                                    <p:cond delay="0"/>
+                                  </p:stCondLst>
+                                  <p:iterate>
+                                    <p:tmAbs val="0"/>
+                                  </p:iterate>
+                                  <p:childTnLst>
+                                    <p:set>
+                                      <p:cBhvr>
+                                        <p:cTn id="20" fill="hold"/>
+                                        <p:tgtEl>
+                                          <p:spTgt spid="190"/>
+                                        </p:tgtEl>
+                                        <p:attrNameLst>
+                                          <p:attrName>style.visibility</p:attrName>
+                                        </p:attrNameLst>
+                                      </p:cBhvr>
+                                      <p:to>
+                                        <p:strVal val="visible"/>
+                                      </p:to>
+                                    </p:set>
+                                  </p:childTnLst>
+                                </p:cTn>
+                              </p:par>
+                            </p:childTnLst>
+                          </p:cTn>
+                        </p:par>
+                      </p:childTnLst>
+                    </p:cTn>
+                  </p:par>
+                </p:childTnLst>
+              </p:cTn>
+              <p:prevCondLst>
+                <p:cond evt="onPrev" delay="0">
+                  <p:tgtEl>
+                    <p:sldTgt/>
+                  </p:tgtEl>
+                </p:cond>
+              </p:prevCondLst>
+              <p:nextCondLst>
+                <p:cond evt="onNext" delay="0">
+                  <p:tgtEl>
+                    <p:sldTgt/>
+                  </p:tgtEl>
+                </p:cond>
+              </p:nextCondLst>
+            </p:seq>
+          </p:childTnLst>
+        </p:cTn>
       </p:par>
     </p:tnLst>
+    <p:bldLst>
+      <p:bldP spid="187" grpId="0" animBg="1" advAuto="0"/>
+      <p:bldP spid="188" grpId="0" animBg="1" advAuto="0"/>
+      <p:bldP spid="188" grpId="1" animBg="1" advAuto="0"/>
+      <p:bldP spid="189" grpId="0" animBg="1" advAuto="0"/>
+      <p:bldP spid="190" grpId="0" animBg="1" advAuto="0"/>
+    </p:bldLst>
   </p:timing>
 </p:sld>
 </file>
@@ -6370,6 +6543,1080 @@
       </p:grpSpPr>
       <p:sp>
         <p:nvSpPr>
+          <p:cNvPr id="192" name="Shape 192"/>
+          <p:cNvSpPr>
+            <a:spLocks noGrp="1"/>
+          </p:cNvSpPr>
+          <p:nvPr>
+            <p:ph type="title"/>
+          </p:nvPr>
+        </p:nvSpPr>
+        <p:spPr>
+          <a:prstGeom prst="rect">
+            <a:avLst/>
+          </a:prstGeom>
+        </p:spPr>
+        <p:txBody>
+          <a:bodyPr/>
+          <a:lstStyle/>
+          <a:p>
+            <a:r>
+              <a:t>Frontend (UI)</a:t>
+            </a:r>
+          </a:p>
+          <a:p>
+            <a:pPr>
+              <a:defRPr sz="3500"/>
+            </a:pPr>
+            <a:r>
+              <a:t>continued…</a:t>
+            </a:r>
+          </a:p>
+        </p:txBody>
+      </p:sp>
+      <p:pic>
+        <p:nvPicPr>
+          <p:cNvPr id="193" name="2015-12-02-184040_1280x1024_scrot.png"/>
+          <p:cNvPicPr>
+            <a:picLocks noChangeAspect="1"/>
+          </p:cNvPicPr>
+          <p:nvPr/>
+        </p:nvPicPr>
+        <p:blipFill>
+          <a:blip r:embed="rId2">
+            <a:extLst/>
+          </a:blip>
+          <a:stretch>
+            <a:fillRect/>
+          </a:stretch>
+        </p:blipFill>
+        <p:spPr>
+          <a:xfrm>
+            <a:off x="0" y="2556762"/>
+            <a:ext cx="9144000" cy="2190960"/>
+          </a:xfrm>
+          <a:prstGeom prst="rect">
+            <a:avLst/>
+          </a:prstGeom>
+          <a:ln w="12700">
+            <a:miter lim="400000"/>
+          </a:ln>
+        </p:spPr>
+      </p:pic>
+      <p:pic>
+        <p:nvPicPr>
+          <p:cNvPr id="194" name="2015-12-02-185750_1280x1024_scrot.png"/>
+          <p:cNvPicPr>
+            <a:picLocks noChangeAspect="1"/>
+          </p:cNvPicPr>
+          <p:nvPr/>
+        </p:nvPicPr>
+        <p:blipFill>
+          <a:blip r:embed="rId3">
+            <a:extLst/>
+          </a:blip>
+          <a:stretch>
+            <a:fillRect/>
+          </a:stretch>
+        </p:blipFill>
+        <p:spPr>
+          <a:xfrm>
+            <a:off x="1816100" y="1681232"/>
+            <a:ext cx="5511800" cy="3060701"/>
+          </a:xfrm>
+          <a:prstGeom prst="rect">
+            <a:avLst/>
+          </a:prstGeom>
+          <a:ln w="12700">
+            <a:miter lim="400000"/>
+          </a:ln>
+        </p:spPr>
+      </p:pic>
+      <p:pic>
+        <p:nvPicPr>
+          <p:cNvPr id="195" name="2015-12-02-200411_1280x1024_scrot.png"/>
+          <p:cNvPicPr>
+            <a:picLocks noChangeAspect="1"/>
+          </p:cNvPicPr>
+          <p:nvPr/>
+        </p:nvPicPr>
+        <p:blipFill>
+          <a:blip r:embed="rId4">
+            <a:extLst/>
+          </a:blip>
+          <a:stretch>
+            <a:fillRect/>
+          </a:stretch>
+        </p:blipFill>
+        <p:spPr>
+          <a:xfrm>
+            <a:off x="141882" y="4872270"/>
+            <a:ext cx="9144001" cy="1615808"/>
+          </a:xfrm>
+          <a:prstGeom prst="rect">
+            <a:avLst/>
+          </a:prstGeom>
+          <a:ln w="12700">
+            <a:miter lim="400000"/>
+          </a:ln>
+        </p:spPr>
+      </p:pic>
+      <p:pic>
+        <p:nvPicPr>
+          <p:cNvPr id="196" name="2015-12-02-200833_1280x1024_scrot.png"/>
+          <p:cNvPicPr>
+            <a:picLocks noChangeAspect="1"/>
+          </p:cNvPicPr>
+          <p:nvPr/>
+        </p:nvPicPr>
+        <p:blipFill>
+          <a:blip r:embed="rId5">
+            <a:extLst/>
+          </a:blip>
+          <a:stretch>
+            <a:fillRect/>
+          </a:stretch>
+        </p:blipFill>
+        <p:spPr>
+          <a:xfrm>
+            <a:off x="412750" y="271611"/>
+            <a:ext cx="8318500" cy="2400301"/>
+          </a:xfrm>
+          <a:prstGeom prst="rect">
+            <a:avLst/>
+          </a:prstGeom>
+          <a:ln w="12700">
+            <a:miter lim="400000"/>
+          </a:ln>
+        </p:spPr>
+      </p:pic>
+      <p:sp>
+        <p:nvSpPr>
+          <p:cNvPr id="197" name="Shape 197"/>
+          <p:cNvSpPr/>
+          <p:nvPr/>
+        </p:nvSpPr>
+        <p:spPr>
+          <a:xfrm>
+            <a:off x="2704744" y="4017243"/>
+            <a:ext cx="479765" cy="455834"/>
+          </a:xfrm>
+          <a:prstGeom prst="star5">
+            <a:avLst>
+              <a:gd name="adj" fmla="val 19100"/>
+              <a:gd name="hf" fmla="val 105146"/>
+              <a:gd name="vf" fmla="val 110557"/>
+            </a:avLst>
+          </a:prstGeom>
+          <a:solidFill>
+            <a:schemeClr val="accent3"/>
+          </a:solidFill>
+          <a:ln w="12700">
+            <a:miter lim="400000"/>
+          </a:ln>
+        </p:spPr>
+        <p:txBody>
+          <a:bodyPr lIns="45719" rIns="45719" anchor="ctr"/>
+          <a:lstStyle/>
+          <a:p>
+            <a:pPr>
+              <a:defRPr>
+                <a:solidFill>
+                  <a:srgbClr val="FFFFFF"/>
+                </a:solidFill>
+              </a:defRPr>
+            </a:pPr>
+            <a:endParaRPr/>
+          </a:p>
+        </p:txBody>
+      </p:sp>
+      <p:sp>
+        <p:nvSpPr>
+          <p:cNvPr id="198" name="Shape 198"/>
+          <p:cNvSpPr/>
+          <p:nvPr/>
+        </p:nvSpPr>
+        <p:spPr>
+          <a:xfrm>
+            <a:off x="7784744" y="4017243"/>
+            <a:ext cx="479764" cy="455834"/>
+          </a:xfrm>
+          <a:prstGeom prst="star5">
+            <a:avLst>
+              <a:gd name="adj" fmla="val 19100"/>
+              <a:gd name="hf" fmla="val 105146"/>
+              <a:gd name="vf" fmla="val 110557"/>
+            </a:avLst>
+          </a:prstGeom>
+          <a:solidFill>
+            <a:schemeClr val="accent3"/>
+          </a:solidFill>
+          <a:ln w="12700">
+            <a:miter lim="400000"/>
+          </a:ln>
+        </p:spPr>
+        <p:txBody>
+          <a:bodyPr lIns="45719" rIns="45719" anchor="ctr"/>
+          <a:lstStyle/>
+          <a:p>
+            <a:pPr>
+              <a:defRPr>
+                <a:solidFill>
+                  <a:srgbClr val="FFFFFF"/>
+                </a:solidFill>
+              </a:defRPr>
+            </a:pPr>
+            <a:endParaRPr/>
+          </a:p>
+        </p:txBody>
+      </p:sp>
+    </p:spTree>
+    <p:extLst>
+      <p:ext uri="{BB962C8B-B14F-4D97-AF65-F5344CB8AC3E}">
+        <p14:creationId xmlns:p14="http://schemas.microsoft.com/office/powerpoint/2010/main" val="724192358"/>
+      </p:ext>
+    </p:extLst>
+  </p:cSld>
+  <p:clrMapOvr>
+    <a:masterClrMapping/>
+  </p:clrMapOvr>
+  <p:transition spd="slow"/>
+  <p:timing>
+    <p:tnLst>
+      <p:par>
+        <p:cTn id="1" dur="indefinite" restart="never" fill="hold" nodeType="tmRoot">
+          <p:childTnLst>
+            <p:seq concurrent="1" prevAc="none" nextAc="seek">
+              <p:cTn id="2" dur="indefinite" fill="hold" nodeType="mainSeq">
+                <p:childTnLst>
+                  <p:par>
+                    <p:cTn id="3" fill="hold">
+                      <p:stCondLst>
+                        <p:cond delay="indefinite"/>
+                      </p:stCondLst>
+                      <p:childTnLst>
+                        <p:par>
+                          <p:cTn id="4" fill="hold">
+                            <p:stCondLst>
+                              <p:cond delay="0"/>
+                            </p:stCondLst>
+                            <p:childTnLst>
+                              <p:par>
+                                <p:cTn id="5" presetID="1" presetClass="entr" presetSubtype="0" fill="hold" grpId="0" nodeType="clickEffect">
+                                  <p:stCondLst>
+                                    <p:cond delay="0"/>
+                                  </p:stCondLst>
+                                  <p:iterate>
+                                    <p:tmAbs val="0"/>
+                                  </p:iterate>
+                                  <p:childTnLst>
+                                    <p:set>
+                                      <p:cBhvr>
+                                        <p:cTn id="6" fill="hold"/>
+                                        <p:tgtEl>
+                                          <p:spTgt spid="194"/>
+                                        </p:tgtEl>
+                                        <p:attrNameLst>
+                                          <p:attrName>style.visibility</p:attrName>
+                                        </p:attrNameLst>
+                                      </p:cBhvr>
+                                      <p:to>
+                                        <p:strVal val="visible"/>
+                                      </p:to>
+                                    </p:set>
+                                  </p:childTnLst>
+                                </p:cTn>
+                              </p:par>
+                            </p:childTnLst>
+                          </p:cTn>
+                        </p:par>
+                      </p:childTnLst>
+                    </p:cTn>
+                  </p:par>
+                  <p:par>
+                    <p:cTn id="7" fill="hold">
+                      <p:stCondLst>
+                        <p:cond delay="indefinite"/>
+                      </p:stCondLst>
+                      <p:childTnLst>
+                        <p:par>
+                          <p:cTn id="8" fill="hold">
+                            <p:stCondLst>
+                              <p:cond delay="0"/>
+                            </p:stCondLst>
+                            <p:childTnLst>
+                              <p:par>
+                                <p:cTn id="9" presetID="1" presetClass="exit" presetSubtype="0" fill="hold" grpId="1" nodeType="clickEffect">
+                                  <p:stCondLst>
+                                    <p:cond delay="0"/>
+                                  </p:stCondLst>
+                                  <p:iterate>
+                                    <p:tmAbs val="0"/>
+                                  </p:iterate>
+                                  <p:childTnLst>
+                                    <p:set>
+                                      <p:cBhvr>
+                                        <p:cTn id="10" fill="hold">
+                                          <p:stCondLst>
+                                            <p:cond delay="0"/>
+                                          </p:stCondLst>
+                                        </p:cTn>
+                                        <p:tgtEl>
+                                          <p:spTgt spid="194"/>
+                                        </p:tgtEl>
+                                        <p:attrNameLst>
+                                          <p:attrName>style.visibility</p:attrName>
+                                        </p:attrNameLst>
+                                      </p:cBhvr>
+                                      <p:to>
+                                        <p:strVal val="hidden"/>
+                                      </p:to>
+                                    </p:set>
+                                  </p:childTnLst>
+                                </p:cTn>
+                              </p:par>
+                            </p:childTnLst>
+                          </p:cTn>
+                        </p:par>
+                        <p:par>
+                          <p:cTn id="11" fill="hold">
+                            <p:stCondLst>
+                              <p:cond delay="0"/>
+                            </p:stCondLst>
+                            <p:childTnLst>
+                              <p:par>
+                                <p:cTn id="12" presetID="1" presetClass="entr" presetSubtype="0" fill="hold" grpId="0" nodeType="afterEffect">
+                                  <p:stCondLst>
+                                    <p:cond delay="0"/>
+                                  </p:stCondLst>
+                                  <p:iterate>
+                                    <p:tmAbs val="0"/>
+                                  </p:iterate>
+                                  <p:childTnLst>
+                                    <p:set>
+                                      <p:cBhvr>
+                                        <p:cTn id="13" fill="hold"/>
+                                        <p:tgtEl>
+                                          <p:spTgt spid="193"/>
+                                        </p:tgtEl>
+                                        <p:attrNameLst>
+                                          <p:attrName>style.visibility</p:attrName>
+                                        </p:attrNameLst>
+                                      </p:cBhvr>
+                                      <p:to>
+                                        <p:strVal val="visible"/>
+                                      </p:to>
+                                    </p:set>
+                                  </p:childTnLst>
+                                </p:cTn>
+                              </p:par>
+                            </p:childTnLst>
+                          </p:cTn>
+                        </p:par>
+                      </p:childTnLst>
+                    </p:cTn>
+                  </p:par>
+                  <p:par>
+                    <p:cTn id="14" fill="hold">
+                      <p:stCondLst>
+                        <p:cond delay="indefinite"/>
+                      </p:stCondLst>
+                      <p:childTnLst>
+                        <p:par>
+                          <p:cTn id="15" fill="hold">
+                            <p:stCondLst>
+                              <p:cond delay="0"/>
+                            </p:stCondLst>
+                            <p:childTnLst>
+                              <p:par>
+                                <p:cTn id="16" presetID="1" presetClass="entr" presetSubtype="0" fill="hold" grpId="0" nodeType="clickEffect">
+                                  <p:stCondLst>
+                                    <p:cond delay="0"/>
+                                  </p:stCondLst>
+                                  <p:iterate>
+                                    <p:tmAbs val="0"/>
+                                  </p:iterate>
+                                  <p:childTnLst>
+                                    <p:set>
+                                      <p:cBhvr>
+                                        <p:cTn id="17" fill="hold"/>
+                                        <p:tgtEl>
+                                          <p:spTgt spid="197"/>
+                                        </p:tgtEl>
+                                        <p:attrNameLst>
+                                          <p:attrName>style.visibility</p:attrName>
+                                        </p:attrNameLst>
+                                      </p:cBhvr>
+                                      <p:to>
+                                        <p:strVal val="visible"/>
+                                      </p:to>
+                                    </p:set>
+                                  </p:childTnLst>
+                                </p:cTn>
+                              </p:par>
+                            </p:childTnLst>
+                          </p:cTn>
+                        </p:par>
+                      </p:childTnLst>
+                    </p:cTn>
+                  </p:par>
+                  <p:par>
+                    <p:cTn id="18" fill="hold">
+                      <p:stCondLst>
+                        <p:cond delay="indefinite"/>
+                      </p:stCondLst>
+                      <p:childTnLst>
+                        <p:par>
+                          <p:cTn id="19" fill="hold">
+                            <p:stCondLst>
+                              <p:cond delay="0"/>
+                            </p:stCondLst>
+                            <p:childTnLst>
+                              <p:par>
+                                <p:cTn id="20" presetID="1" presetClass="entr" presetSubtype="0" fill="hold" grpId="0" nodeType="clickEffect">
+                                  <p:stCondLst>
+                                    <p:cond delay="0"/>
+                                  </p:stCondLst>
+                                  <p:iterate>
+                                    <p:tmAbs val="0"/>
+                                  </p:iterate>
+                                  <p:childTnLst>
+                                    <p:set>
+                                      <p:cBhvr>
+                                        <p:cTn id="21" fill="hold"/>
+                                        <p:tgtEl>
+                                          <p:spTgt spid="196"/>
+                                        </p:tgtEl>
+                                        <p:attrNameLst>
+                                          <p:attrName>style.visibility</p:attrName>
+                                        </p:attrNameLst>
+                                      </p:cBhvr>
+                                      <p:to>
+                                        <p:strVal val="visible"/>
+                                      </p:to>
+                                    </p:set>
+                                  </p:childTnLst>
+                                </p:cTn>
+                              </p:par>
+                            </p:childTnLst>
+                          </p:cTn>
+                        </p:par>
+                      </p:childTnLst>
+                    </p:cTn>
+                  </p:par>
+                  <p:par>
+                    <p:cTn id="22" fill="hold">
+                      <p:stCondLst>
+                        <p:cond delay="indefinite"/>
+                      </p:stCondLst>
+                      <p:childTnLst>
+                        <p:par>
+                          <p:cTn id="23" fill="hold">
+                            <p:stCondLst>
+                              <p:cond delay="0"/>
+                            </p:stCondLst>
+                            <p:childTnLst>
+                              <p:par>
+                                <p:cTn id="24" presetID="1" presetClass="exit" presetSubtype="0" fill="hold" grpId="1" nodeType="clickEffect">
+                                  <p:stCondLst>
+                                    <p:cond delay="0"/>
+                                  </p:stCondLst>
+                                  <p:iterate>
+                                    <p:tmAbs val="0"/>
+                                  </p:iterate>
+                                  <p:childTnLst>
+                                    <p:set>
+                                      <p:cBhvr>
+                                        <p:cTn id="25" fill="hold">
+                                          <p:stCondLst>
+                                            <p:cond delay="0"/>
+                                          </p:stCondLst>
+                                        </p:cTn>
+                                        <p:tgtEl>
+                                          <p:spTgt spid="196"/>
+                                        </p:tgtEl>
+                                        <p:attrNameLst>
+                                          <p:attrName>style.visibility</p:attrName>
+                                        </p:attrNameLst>
+                                      </p:cBhvr>
+                                      <p:to>
+                                        <p:strVal val="hidden"/>
+                                      </p:to>
+                                    </p:set>
+                                  </p:childTnLst>
+                                </p:cTn>
+                              </p:par>
+                            </p:childTnLst>
+                          </p:cTn>
+                        </p:par>
+                        <p:par>
+                          <p:cTn id="26" fill="hold">
+                            <p:stCondLst>
+                              <p:cond delay="0"/>
+                            </p:stCondLst>
+                            <p:childTnLst>
+                              <p:par>
+                                <p:cTn id="27" presetID="1" presetClass="exit" presetSubtype="0" fill="hold" grpId="1" nodeType="afterEffect">
+                                  <p:stCondLst>
+                                    <p:cond delay="0"/>
+                                  </p:stCondLst>
+                                  <p:iterate>
+                                    <p:tmAbs val="0"/>
+                                  </p:iterate>
+                                  <p:childTnLst>
+                                    <p:set>
+                                      <p:cBhvr>
+                                        <p:cTn id="28" fill="hold">
+                                          <p:stCondLst>
+                                            <p:cond delay="0"/>
+                                          </p:stCondLst>
+                                        </p:cTn>
+                                        <p:tgtEl>
+                                          <p:spTgt spid="197"/>
+                                        </p:tgtEl>
+                                        <p:attrNameLst>
+                                          <p:attrName>style.visibility</p:attrName>
+                                        </p:attrNameLst>
+                                      </p:cBhvr>
+                                      <p:to>
+                                        <p:strVal val="hidden"/>
+                                      </p:to>
+                                    </p:set>
+                                  </p:childTnLst>
+                                </p:cTn>
+                              </p:par>
+                            </p:childTnLst>
+                          </p:cTn>
+                        </p:par>
+                        <p:par>
+                          <p:cTn id="29" fill="hold">
+                            <p:stCondLst>
+                              <p:cond delay="0"/>
+                            </p:stCondLst>
+                            <p:childTnLst>
+                              <p:par>
+                                <p:cTn id="30" presetID="1" presetClass="entr" presetSubtype="0" fill="hold" grpId="0" nodeType="afterEffect">
+                                  <p:stCondLst>
+                                    <p:cond delay="0"/>
+                                  </p:stCondLst>
+                                  <p:iterate>
+                                    <p:tmAbs val="0"/>
+                                  </p:iterate>
+                                  <p:childTnLst>
+                                    <p:set>
+                                      <p:cBhvr>
+                                        <p:cTn id="31" fill="hold"/>
+                                        <p:tgtEl>
+                                          <p:spTgt spid="198"/>
+                                        </p:tgtEl>
+                                        <p:attrNameLst>
+                                          <p:attrName>style.visibility</p:attrName>
+                                        </p:attrNameLst>
+                                      </p:cBhvr>
+                                      <p:to>
+                                        <p:strVal val="visible"/>
+                                      </p:to>
+                                    </p:set>
+                                  </p:childTnLst>
+                                </p:cTn>
+                              </p:par>
+                            </p:childTnLst>
+                          </p:cTn>
+                        </p:par>
+                      </p:childTnLst>
+                    </p:cTn>
+                  </p:par>
+                  <p:par>
+                    <p:cTn id="32" fill="hold">
+                      <p:stCondLst>
+                        <p:cond delay="indefinite"/>
+                      </p:stCondLst>
+                      <p:childTnLst>
+                        <p:par>
+                          <p:cTn id="33" fill="hold">
+                            <p:stCondLst>
+                              <p:cond delay="0"/>
+                            </p:stCondLst>
+                            <p:childTnLst>
+                              <p:par>
+                                <p:cTn id="34" presetID="1" presetClass="entr" presetSubtype="0" fill="hold" grpId="0" nodeType="clickEffect">
+                                  <p:stCondLst>
+                                    <p:cond delay="0"/>
+                                  </p:stCondLst>
+                                  <p:iterate>
+                                    <p:tmAbs val="0"/>
+                                  </p:iterate>
+                                  <p:childTnLst>
+                                    <p:set>
+                                      <p:cBhvr>
+                                        <p:cTn id="35" fill="hold"/>
+                                        <p:tgtEl>
+                                          <p:spTgt spid="195"/>
+                                        </p:tgtEl>
+                                        <p:attrNameLst>
+                                          <p:attrName>style.visibility</p:attrName>
+                                        </p:attrNameLst>
+                                      </p:cBhvr>
+                                      <p:to>
+                                        <p:strVal val="visible"/>
+                                      </p:to>
+                                    </p:set>
+                                  </p:childTnLst>
+                                </p:cTn>
+                              </p:par>
+                            </p:childTnLst>
+                          </p:cTn>
+                        </p:par>
+                      </p:childTnLst>
+                    </p:cTn>
+                  </p:par>
+                </p:childTnLst>
+              </p:cTn>
+              <p:prevCondLst>
+                <p:cond evt="onPrev" delay="0">
+                  <p:tgtEl>
+                    <p:sldTgt/>
+                  </p:tgtEl>
+                </p:cond>
+              </p:prevCondLst>
+              <p:nextCondLst>
+                <p:cond evt="onNext" delay="0">
+                  <p:tgtEl>
+                    <p:sldTgt/>
+                  </p:tgtEl>
+                </p:cond>
+              </p:nextCondLst>
+            </p:seq>
+          </p:childTnLst>
+        </p:cTn>
+      </p:par>
+    </p:tnLst>
+    <p:bldLst>
+      <p:bldP spid="193" grpId="0" animBg="1" advAuto="0"/>
+      <p:bldP spid="194" grpId="0" animBg="1" advAuto="0"/>
+      <p:bldP spid="194" grpId="1" animBg="1" advAuto="0"/>
+      <p:bldP spid="195" grpId="0" animBg="1" advAuto="0"/>
+      <p:bldP spid="196" grpId="0" animBg="1" advAuto="0"/>
+      <p:bldP spid="196" grpId="1" animBg="1" advAuto="0"/>
+      <p:bldP spid="197" grpId="0" animBg="1" advAuto="0"/>
+      <p:bldP spid="197" grpId="1" animBg="1" advAuto="0"/>
+      <p:bldP spid="198" grpId="0" animBg="1" advAuto="0"/>
+    </p:bldLst>
+  </p:timing>
+</p:sld>
+</file>
+
+<file path=ppt/slides/slide12.xml><?xml version="1.0" encoding="utf-8"?>
+<p:sld xmlns:a="http://schemas.openxmlformats.org/drawingml/2006/main" xmlns:r="http://schemas.openxmlformats.org/officeDocument/2006/relationships" xmlns:p="http://schemas.openxmlformats.org/presentationml/2006/main">
+  <p:cSld>
+    <p:spTree>
+      <p:nvGrpSpPr>
+        <p:cNvPr id="1" name=""/>
+        <p:cNvGrpSpPr/>
+        <p:nvPr/>
+      </p:nvGrpSpPr>
+      <p:grpSpPr>
+        <a:xfrm>
+          <a:off x="0" y="0"/>
+          <a:ext cx="0" cy="0"/>
+          <a:chOff x="0" y="0"/>
+          <a:chExt cx="0" cy="0"/>
+        </a:xfrm>
+      </p:grpSpPr>
+      <p:sp>
+        <p:nvSpPr>
+          <p:cNvPr id="200" name="Shape 200"/>
+          <p:cNvSpPr>
+            <a:spLocks noGrp="1"/>
+          </p:cNvSpPr>
+          <p:nvPr>
+            <p:ph type="title"/>
+          </p:nvPr>
+        </p:nvSpPr>
+        <p:spPr>
+          <a:prstGeom prst="rect">
+            <a:avLst/>
+          </a:prstGeom>
+        </p:spPr>
+        <p:txBody>
+          <a:bodyPr/>
+          <a:lstStyle/>
+          <a:p>
+            <a:r>
+              <a:t>Frontend (UI)</a:t>
+            </a:r>
+          </a:p>
+          <a:p>
+            <a:pPr>
+              <a:defRPr sz="3500"/>
+            </a:pPr>
+            <a:r>
+              <a:t>continued…</a:t>
+            </a:r>
+          </a:p>
+        </p:txBody>
+      </p:sp>
+      <p:sp>
+        <p:nvSpPr>
+          <p:cNvPr id="201" name="Shape 201"/>
+          <p:cNvSpPr>
+            <a:spLocks noGrp="1"/>
+          </p:cNvSpPr>
+          <p:nvPr>
+            <p:ph type="body" idx="1"/>
+          </p:nvPr>
+        </p:nvSpPr>
+        <p:spPr>
+          <a:prstGeom prst="rect">
+            <a:avLst/>
+          </a:prstGeom>
+        </p:spPr>
+        <p:txBody>
+          <a:bodyPr/>
+          <a:lstStyle/>
+          <a:p>
+            <a:pPr>
+              <a:buBlip>
+                <a:blip r:embed="rId2"/>
+              </a:buBlip>
+            </a:pPr>
+            <a:endParaRPr/>
+          </a:p>
+        </p:txBody>
+      </p:sp>
+      <p:pic>
+        <p:nvPicPr>
+          <p:cNvPr id="202" name="2015-12-02-160412_1280x1024_scrot.png"/>
+          <p:cNvPicPr>
+            <a:picLocks noChangeAspect="1"/>
+          </p:cNvPicPr>
+          <p:nvPr/>
+        </p:nvPicPr>
+        <p:blipFill>
+          <a:blip r:embed="rId3">
+            <a:extLst/>
+          </a:blip>
+          <a:stretch>
+            <a:fillRect/>
+          </a:stretch>
+        </p:blipFill>
+        <p:spPr>
+          <a:xfrm>
+            <a:off x="853865" y="0"/>
+            <a:ext cx="7966992" cy="6858000"/>
+          </a:xfrm>
+          <a:prstGeom prst="rect">
+            <a:avLst/>
+          </a:prstGeom>
+          <a:ln w="12700">
+            <a:miter lim="400000"/>
+          </a:ln>
+        </p:spPr>
+      </p:pic>
+      <p:pic>
+        <p:nvPicPr>
+          <p:cNvPr id="203" name="2015-12-02-160702_1280x1024_scrot.png"/>
+          <p:cNvPicPr>
+            <a:picLocks noChangeAspect="1"/>
+          </p:cNvPicPr>
+          <p:nvPr/>
+        </p:nvPicPr>
+        <p:blipFill>
+          <a:blip r:embed="rId4">
+            <a:extLst/>
+          </a:blip>
+          <a:stretch>
+            <a:fillRect/>
+          </a:stretch>
+        </p:blipFill>
+        <p:spPr>
+          <a:xfrm>
+            <a:off x="0" y="644619"/>
+            <a:ext cx="9144000" cy="5568762"/>
+          </a:xfrm>
+          <a:prstGeom prst="rect">
+            <a:avLst/>
+          </a:prstGeom>
+          <a:ln w="12700">
+            <a:miter lim="400000"/>
+          </a:ln>
+        </p:spPr>
+      </p:pic>
+    </p:spTree>
+    <p:extLst>
+      <p:ext uri="{BB962C8B-B14F-4D97-AF65-F5344CB8AC3E}">
+        <p14:creationId xmlns:p14="http://schemas.microsoft.com/office/powerpoint/2010/main" val="1148160324"/>
+      </p:ext>
+    </p:extLst>
+  </p:cSld>
+  <p:clrMapOvr>
+    <a:masterClrMapping/>
+  </p:clrMapOvr>
+  <p:transition spd="slow"/>
+  <p:timing>
+    <p:tnLst>
+      <p:par>
+        <p:cTn id="1" dur="indefinite" restart="never" fill="hold" nodeType="tmRoot">
+          <p:childTnLst>
+            <p:seq concurrent="1" prevAc="none" nextAc="seek">
+              <p:cTn id="2" dur="indefinite" fill="hold" nodeType="mainSeq">
+                <p:childTnLst>
+                  <p:par>
+                    <p:cTn id="3" fill="hold">
+                      <p:stCondLst>
+                        <p:cond delay="indefinite"/>
+                      </p:stCondLst>
+                      <p:childTnLst>
+                        <p:par>
+                          <p:cTn id="4" fill="hold">
+                            <p:stCondLst>
+                              <p:cond delay="0"/>
+                            </p:stCondLst>
+                            <p:childTnLst>
+                              <p:par>
+                                <p:cTn id="5" presetID="1" presetClass="entr" presetSubtype="0" fill="hold" grpId="0" nodeType="clickEffect">
+                                  <p:stCondLst>
+                                    <p:cond delay="0"/>
+                                  </p:stCondLst>
+                                  <p:iterate>
+                                    <p:tmAbs val="0"/>
+                                  </p:iterate>
+                                  <p:childTnLst>
+                                    <p:set>
+                                      <p:cBhvr>
+                                        <p:cTn id="6" fill="hold"/>
+                                        <p:tgtEl>
+                                          <p:spTgt spid="202"/>
+                                        </p:tgtEl>
+                                        <p:attrNameLst>
+                                          <p:attrName>style.visibility</p:attrName>
+                                        </p:attrNameLst>
+                                      </p:cBhvr>
+                                      <p:to>
+                                        <p:strVal val="visible"/>
+                                      </p:to>
+                                    </p:set>
+                                  </p:childTnLst>
+                                </p:cTn>
+                              </p:par>
+                            </p:childTnLst>
+                          </p:cTn>
+                        </p:par>
+                      </p:childTnLst>
+                    </p:cTn>
+                  </p:par>
+                  <p:par>
+                    <p:cTn id="7" fill="hold">
+                      <p:stCondLst>
+                        <p:cond delay="indefinite"/>
+                      </p:stCondLst>
+                      <p:childTnLst>
+                        <p:par>
+                          <p:cTn id="8" fill="hold">
+                            <p:stCondLst>
+                              <p:cond delay="0"/>
+                            </p:stCondLst>
+                            <p:childTnLst>
+                              <p:par>
+                                <p:cTn id="9" presetID="1" presetClass="exit" presetSubtype="0" fill="hold" grpId="1" nodeType="clickEffect">
+                                  <p:stCondLst>
+                                    <p:cond delay="0"/>
+                                  </p:stCondLst>
+                                  <p:iterate>
+                                    <p:tmAbs val="0"/>
+                                  </p:iterate>
+                                  <p:childTnLst>
+                                    <p:set>
+                                      <p:cBhvr>
+                                        <p:cTn id="10" fill="hold">
+                                          <p:stCondLst>
+                                            <p:cond delay="0"/>
+                                          </p:stCondLst>
+                                        </p:cTn>
+                                        <p:tgtEl>
+                                          <p:spTgt spid="202"/>
+                                        </p:tgtEl>
+                                        <p:attrNameLst>
+                                          <p:attrName>style.visibility</p:attrName>
+                                        </p:attrNameLst>
+                                      </p:cBhvr>
+                                      <p:to>
+                                        <p:strVal val="hidden"/>
+                                      </p:to>
+                                    </p:set>
+                                  </p:childTnLst>
+                                </p:cTn>
+                              </p:par>
+                            </p:childTnLst>
+                          </p:cTn>
+                        </p:par>
+                        <p:par>
+                          <p:cTn id="11" fill="hold">
+                            <p:stCondLst>
+                              <p:cond delay="0"/>
+                            </p:stCondLst>
+                            <p:childTnLst>
+                              <p:par>
+                                <p:cTn id="12" presetID="1" presetClass="entr" presetSubtype="0" fill="hold" grpId="0" nodeType="afterEffect">
+                                  <p:stCondLst>
+                                    <p:cond delay="0"/>
+                                  </p:stCondLst>
+                                  <p:iterate>
+                                    <p:tmAbs val="0"/>
+                                  </p:iterate>
+                                  <p:childTnLst>
+                                    <p:set>
+                                      <p:cBhvr>
+                                        <p:cTn id="13" fill="hold"/>
+                                        <p:tgtEl>
+                                          <p:spTgt spid="203"/>
+                                        </p:tgtEl>
+                                        <p:attrNameLst>
+                                          <p:attrName>style.visibility</p:attrName>
+                                        </p:attrNameLst>
+                                      </p:cBhvr>
+                                      <p:to>
+                                        <p:strVal val="visible"/>
+                                      </p:to>
+                                    </p:set>
+                                  </p:childTnLst>
+                                </p:cTn>
+                              </p:par>
+                            </p:childTnLst>
+                          </p:cTn>
+                        </p:par>
+                      </p:childTnLst>
+                    </p:cTn>
+                  </p:par>
+                </p:childTnLst>
+              </p:cTn>
+              <p:prevCondLst>
+                <p:cond evt="onPrev" delay="0">
+                  <p:tgtEl>
+                    <p:sldTgt/>
+                  </p:tgtEl>
+                </p:cond>
+              </p:prevCondLst>
+              <p:nextCondLst>
+                <p:cond evt="onNext" delay="0">
+                  <p:tgtEl>
+                    <p:sldTgt/>
+                  </p:tgtEl>
+                </p:cond>
+              </p:nextCondLst>
+            </p:seq>
+          </p:childTnLst>
+        </p:cTn>
+      </p:par>
+    </p:tnLst>
+    <p:bldLst>
+      <p:bldP spid="202" grpId="0" animBg="1" advAuto="0"/>
+      <p:bldP spid="202" grpId="1" animBg="1" advAuto="0"/>
+      <p:bldP spid="203" grpId="0" animBg="1" advAuto="0"/>
+    </p:bldLst>
+  </p:timing>
+</p:sld>
+</file>
+
+<file path=ppt/slides/slide13.xml><?xml version="1.0" encoding="utf-8"?>
+<p:sld xmlns:a="http://schemas.openxmlformats.org/drawingml/2006/main" xmlns:r="http://schemas.openxmlformats.org/officeDocument/2006/relationships" xmlns:p="http://schemas.openxmlformats.org/presentationml/2006/main">
+  <p:cSld>
+    <p:spTree>
+      <p:nvGrpSpPr>
+        <p:cNvPr id="1" name=""/>
+        <p:cNvGrpSpPr/>
+        <p:nvPr/>
+      </p:nvGrpSpPr>
+      <p:grpSpPr>
+        <a:xfrm>
+          <a:off x="0" y="0"/>
+          <a:ext cx="0" cy="0"/>
+          <a:chOff x="0" y="0"/>
+          <a:chExt cx="0" cy="0"/>
+        </a:xfrm>
+      </p:grpSpPr>
+      <p:sp>
+        <p:nvSpPr>
+          <p:cNvPr id="2" name="Title 1"/>
+          <p:cNvSpPr>
+            <a:spLocks noGrp="1"/>
+          </p:cNvSpPr>
+          <p:nvPr>
+            <p:ph type="title"/>
+          </p:nvPr>
+        </p:nvSpPr>
+        <p:spPr/>
+        <p:txBody>
+          <a:bodyPr/>
+          <a:lstStyle/>
+          <a:p>
+            <a:r>
+              <a:rPr lang="en-US" dirty="0" smtClean="0"/>
+              <a:t>Changes</a:t>
+            </a:r>
+            <a:endParaRPr lang="en-US" dirty="0"/>
+          </a:p>
+        </p:txBody>
+      </p:sp>
+      <p:sp>
+        <p:nvSpPr>
+          <p:cNvPr id="3" name="Content Placeholder 2"/>
+          <p:cNvSpPr>
+            <a:spLocks noGrp="1"/>
+          </p:cNvSpPr>
+          <p:nvPr>
+            <p:ph idx="1"/>
+          </p:nvPr>
+        </p:nvSpPr>
+        <p:spPr/>
+        <p:txBody>
+          <a:bodyPr/>
+          <a:lstStyle/>
+          <a:p>
+            <a:r>
+              <a:rPr lang="en-US" dirty="0" smtClean="0"/>
+              <a:t>Switched from Arduino Pro Mini with an ESP8266 module to a </a:t>
+            </a:r>
+            <a:r>
+              <a:rPr lang="en-US" smtClean="0"/>
+              <a:t>NodeMCU</a:t>
+            </a:r>
+            <a:endParaRPr lang="en-US"/>
+          </a:p>
+        </p:txBody>
+      </p:sp>
+    </p:spTree>
+    <p:extLst>
+      <p:ext uri="{BB962C8B-B14F-4D97-AF65-F5344CB8AC3E}">
+        <p14:creationId xmlns:p14="http://schemas.microsoft.com/office/powerpoint/2010/main" val="2089127264"/>
+      </p:ext>
+    </p:extLst>
+  </p:cSld>
+  <p:clrMapOvr>
+    <a:masterClrMapping/>
+  </p:clrMapOvr>
+</p:sld>
+</file>
+
+<file path=ppt/slides/slide14.xml><?xml version="1.0" encoding="utf-8"?>
+<p:sld xmlns:a="http://schemas.openxmlformats.org/drawingml/2006/main" xmlns:r="http://schemas.openxmlformats.org/officeDocument/2006/relationships" xmlns:p="http://schemas.openxmlformats.org/presentationml/2006/main">
+  <p:cSld>
+    <p:spTree>
+      <p:nvGrpSpPr>
+        <p:cNvPr id="1" name=""/>
+        <p:cNvGrpSpPr/>
+        <p:nvPr/>
+      </p:nvGrpSpPr>
+      <p:grpSpPr>
+        <a:xfrm>
+          <a:off x="0" y="0"/>
+          <a:ext cx="0" cy="0"/>
+          <a:chOff x="0" y="0"/>
+          <a:chExt cx="0" cy="0"/>
+        </a:xfrm>
+      </p:grpSpPr>
+      <p:sp>
+        <p:nvSpPr>
           <p:cNvPr id="2" name="Title 1"/>
           <p:cNvSpPr>
             <a:spLocks noGrp="1"/>
@@ -6466,7 +7713,7 @@
 </p:sld>
 </file>
 
-<file path=ppt/slides/slide12.xml><?xml version="1.0" encoding="utf-8"?>
+<file path=ppt/slides/slide15.xml><?xml version="1.0" encoding="utf-8"?>
 <p:sld xmlns:a="http://schemas.openxmlformats.org/drawingml/2006/main" xmlns:r="http://schemas.openxmlformats.org/officeDocument/2006/relationships" xmlns:p="http://schemas.openxmlformats.org/presentationml/2006/main">
   <p:cSld>
     <p:spTree>
@@ -6543,66 +7790,6 @@
           <a:chExt cx="0" cy="0"/>
         </a:xfrm>
       </p:grpSpPr>
-      <p:pic>
-        <p:nvPicPr>
-          <p:cNvPr id="6" name="Picture 5" descr="tumblr_lfo0gz7n2T1qc9h2yo1_500.png"/>
-          <p:cNvPicPr>
-            <a:picLocks noChangeAspect="1"/>
-          </p:cNvPicPr>
-          <p:nvPr/>
-        </p:nvPicPr>
-        <p:blipFill>
-          <a:blip r:embed="rId3" cstate="email">
-            <a:extLst>
-              <a:ext uri="{28A0092B-C50C-407E-A947-70E740481C1C}">
-                <a14:useLocalDpi xmlns:a14="http://schemas.microsoft.com/office/drawing/2010/main" val="0"/>
-              </a:ext>
-            </a:extLst>
-          </a:blip>
-          <a:stretch>
-            <a:fillRect/>
-          </a:stretch>
-        </p:blipFill>
-        <p:spPr>
-          <a:xfrm>
-            <a:off x="6314137" y="3408896"/>
-            <a:ext cx="2829863" cy="2829863"/>
-          </a:xfrm>
-          <a:prstGeom prst="rect">
-            <a:avLst/>
-          </a:prstGeom>
-        </p:spPr>
-      </p:pic>
-      <p:pic>
-        <p:nvPicPr>
-          <p:cNvPr id="5" name="Picture 4" descr="giphy.gif"/>
-          <p:cNvPicPr>
-            <a:picLocks noChangeAspect="1"/>
-          </p:cNvPicPr>
-          <p:nvPr/>
-        </p:nvPicPr>
-        <p:blipFill>
-          <a:blip r:embed="rId4" cstate="email">
-            <a:extLst>
-              <a:ext uri="{28A0092B-C50C-407E-A947-70E740481C1C}">
-                <a14:useLocalDpi xmlns:a14="http://schemas.microsoft.com/office/drawing/2010/main" val="0"/>
-              </a:ext>
-            </a:extLst>
-          </a:blip>
-          <a:stretch>
-            <a:fillRect/>
-          </a:stretch>
-        </p:blipFill>
-        <p:spPr>
-          <a:xfrm>
-            <a:off x="2281062" y="3307976"/>
-            <a:ext cx="4051220" cy="3038415"/>
-          </a:xfrm>
-          <a:prstGeom prst="rect">
-            <a:avLst/>
-          </a:prstGeom>
-        </p:spPr>
-      </p:pic>
       <p:sp>
         <p:nvSpPr>
           <p:cNvPr id="2" name="Title 1"/>
@@ -6672,36 +7859,6 @@
           </a:p>
         </p:txBody>
       </p:sp>
-      <p:pic>
-        <p:nvPicPr>
-          <p:cNvPr id="7" name="Picture 6"/>
-          <p:cNvPicPr>
-            <a:picLocks noChangeAspect="1"/>
-          </p:cNvPicPr>
-          <p:nvPr/>
-        </p:nvPicPr>
-        <p:blipFill>
-          <a:blip r:embed="rId5" cstate="email">
-            <a:extLst>
-              <a:ext uri="{28A0092B-C50C-407E-A947-70E740481C1C}">
-                <a14:useLocalDpi xmlns:a14="http://schemas.microsoft.com/office/drawing/2010/main" val="0"/>
-              </a:ext>
-            </a:extLst>
-          </a:blip>
-          <a:stretch>
-            <a:fillRect/>
-          </a:stretch>
-        </p:blipFill>
-        <p:spPr>
-          <a:xfrm>
-            <a:off x="0" y="3301266"/>
-            <a:ext cx="2281062" cy="3045125"/>
-          </a:xfrm>
-          <a:prstGeom prst="rect">
-            <a:avLst/>
-          </a:prstGeom>
-        </p:spPr>
-      </p:pic>
     </p:spTree>
     <p:extLst>
       <p:ext uri="{BB962C8B-B14F-4D97-AF65-F5344CB8AC3E}">
@@ -6746,7 +7903,11 @@
                                           </p:stCondLst>
                                         </p:cTn>
                                         <p:tgtEl>
-                                          <p:spTgt spid="7"/>
+                                          <p:spTgt spid="3">
+                                            <p:txEl>
+                                              <p:pRg st="1" end="1"/>
+                                            </p:txEl>
+                                          </p:spTgt>
                                         </p:tgtEl>
                                         <p:attrNameLst>
                                           <p:attrName>style.visibility</p:attrName>
@@ -6793,146 +7954,6 @@
                                         <p:tgtEl>
                                           <p:spTgt spid="3">
                                             <p:txEl>
-                                              <p:pRg st="1" end="1"/>
-                                            </p:txEl>
-                                          </p:spTgt>
-                                        </p:tgtEl>
-                                        <p:attrNameLst>
-                                          <p:attrName>style.visibility</p:attrName>
-                                        </p:attrNameLst>
-                                      </p:cBhvr>
-                                      <p:to>
-                                        <p:strVal val="visible"/>
-                                      </p:to>
-                                    </p:set>
-                                  </p:childTnLst>
-                                </p:cTn>
-                              </p:par>
-                            </p:childTnLst>
-                          </p:cTn>
-                        </p:par>
-                      </p:childTnLst>
-                    </p:cTn>
-                  </p:par>
-                  <p:par>
-                    <p:cTn id="11" fill="hold">
-                      <p:stCondLst>
-                        <p:cond delay="indefinite"/>
-                      </p:stCondLst>
-                      <p:childTnLst>
-                        <p:par>
-                          <p:cTn id="12" fill="hold">
-                            <p:stCondLst>
-                              <p:cond delay="0"/>
-                            </p:stCondLst>
-                            <p:childTnLst>
-                              <p:par>
-                                <p:cTn id="13" presetID="2" presetClass="entr" presetSubtype="4" fill="hold" nodeType="clickEffect">
-                                  <p:stCondLst>
-                                    <p:cond delay="0"/>
-                                  </p:stCondLst>
-                                  <p:childTnLst>
-                                    <p:set>
-                                      <p:cBhvr>
-                                        <p:cTn id="14" dur="1" fill="hold">
-                                          <p:stCondLst>
-                                            <p:cond delay="0"/>
-                                          </p:stCondLst>
-                                        </p:cTn>
-                                        <p:tgtEl>
-                                          <p:spTgt spid="6"/>
-                                        </p:tgtEl>
-                                        <p:attrNameLst>
-                                          <p:attrName>style.visibility</p:attrName>
-                                        </p:attrNameLst>
-                                      </p:cBhvr>
-                                      <p:to>
-                                        <p:strVal val="visible"/>
-                                      </p:to>
-                                    </p:set>
-                                    <p:anim calcmode="lin" valueType="num">
-                                      <p:cBhvr additive="base">
-                                        <p:cTn id="15" dur="500" fill="hold"/>
-                                        <p:tgtEl>
-                                          <p:spTgt spid="6"/>
-                                        </p:tgtEl>
-                                        <p:attrNameLst>
-                                          <p:attrName>ppt_x</p:attrName>
-                                        </p:attrNameLst>
-                                      </p:cBhvr>
-                                      <p:tavLst>
-                                        <p:tav tm="0">
-                                          <p:val>
-                                            <p:strVal val="#ppt_x"/>
-                                          </p:val>
-                                        </p:tav>
-                                        <p:tav tm="100000">
-                                          <p:val>
-                                            <p:strVal val="#ppt_x"/>
-                                          </p:val>
-                                        </p:tav>
-                                      </p:tavLst>
-                                    </p:anim>
-                                    <p:anim calcmode="lin" valueType="num">
-                                      <p:cBhvr additive="base">
-                                        <p:cTn id="16" dur="500" fill="hold"/>
-                                        <p:tgtEl>
-                                          <p:spTgt spid="6"/>
-                                        </p:tgtEl>
-                                        <p:attrNameLst>
-                                          <p:attrName>ppt_y</p:attrName>
-                                        </p:attrNameLst>
-                                      </p:cBhvr>
-                                      <p:tavLst>
-                                        <p:tav tm="0">
-                                          <p:val>
-                                            <p:strVal val="1+#ppt_h/2"/>
-                                          </p:val>
-                                        </p:tav>
-                                        <p:tav tm="100000">
-                                          <p:val>
-                                            <p:strVal val="#ppt_y"/>
-                                          </p:val>
-                                        </p:tav>
-                                      </p:tavLst>
-                                    </p:anim>
-                                  </p:childTnLst>
-                                </p:cTn>
-                              </p:par>
-                            </p:childTnLst>
-                          </p:cTn>
-                        </p:par>
-                      </p:childTnLst>
-                    </p:cTn>
-                  </p:par>
-                  <p:par>
-                    <p:cTn id="17" fill="hold">
-                      <p:stCondLst>
-                        <p:cond delay="indefinite"/>
-                      </p:stCondLst>
-                      <p:childTnLst>
-                        <p:par>
-                          <p:cTn id="18" fill="hold">
-                            <p:stCondLst>
-                              <p:cond delay="0"/>
-                            </p:stCondLst>
-                            <p:childTnLst>
-                              <p:par>
-                                <p:cTn id="19" presetID="1" presetClass="entr" presetSubtype="0" fill="hold" nodeType="clickEffect">
-                                  <p:stCondLst>
-                                    <p:cond delay="0"/>
-                                  </p:stCondLst>
-                                  <p:childTnLst>
-                                    <p:set>
-                                      <p:cBhvr>
-                                        <p:cTn id="20" dur="1" fill="hold">
-                                          <p:stCondLst>
-                                            <p:cond delay="0"/>
-                                          </p:stCondLst>
-                                        </p:cTn>
-                                        <p:tgtEl>
-                                          <p:spTgt spid="3">
-                                            <p:txEl>
                                               <p:pRg st="2" end="2"/>
                                             </p:txEl>
                                           </p:spTgt>
@@ -6945,59 +7966,6 @@
                                         <p:strVal val="visible"/>
                                       </p:to>
                                     </p:set>
-                                  </p:childTnLst>
-                                </p:cTn>
-                              </p:par>
-                            </p:childTnLst>
-                          </p:cTn>
-                        </p:par>
-                      </p:childTnLst>
-                    </p:cTn>
-                  </p:par>
-                  <p:par>
-                    <p:cTn id="21" fill="hold">
-                      <p:stCondLst>
-                        <p:cond delay="indefinite"/>
-                      </p:stCondLst>
-                      <p:childTnLst>
-                        <p:par>
-                          <p:cTn id="22" fill="hold">
-                            <p:stCondLst>
-                              <p:cond delay="0"/>
-                            </p:stCondLst>
-                            <p:childTnLst>
-                              <p:par>
-                                <p:cTn id="23" presetID="5" presetClass="entr" presetSubtype="10" fill="hold" nodeType="clickEffect">
-                                  <p:stCondLst>
-                                    <p:cond delay="0"/>
-                                  </p:stCondLst>
-                                  <p:childTnLst>
-                                    <p:set>
-                                      <p:cBhvr>
-                                        <p:cTn id="24" dur="1" fill="hold">
-                                          <p:stCondLst>
-                                            <p:cond delay="0"/>
-                                          </p:stCondLst>
-                                        </p:cTn>
-                                        <p:tgtEl>
-                                          <p:spTgt spid="5"/>
-                                        </p:tgtEl>
-                                        <p:attrNameLst>
-                                          <p:attrName>style.visibility</p:attrName>
-                                        </p:attrNameLst>
-                                      </p:cBhvr>
-                                      <p:to>
-                                        <p:strVal val="visible"/>
-                                      </p:to>
-                                    </p:set>
-                                    <p:animEffect transition="in" filter="checkerboard(across)">
-                                      <p:cBhvr>
-                                        <p:cTn id="25" dur="500"/>
-                                        <p:tgtEl>
-                                          <p:spTgt spid="5"/>
-                                        </p:tgtEl>
-                                      </p:cBhvr>
-                                    </p:animEffect>
                                   </p:childTnLst>
                                 </p:cTn>
                               </p:par>
@@ -7200,145 +8168,6 @@
 </file>
 
 <file path=ppt/slides/slide4.xml><?xml version="1.0" encoding="utf-8"?>
-<p:sld xmlns:a="http://schemas.openxmlformats.org/drawingml/2006/main" xmlns:r="http://schemas.openxmlformats.org/officeDocument/2006/relationships" xmlns:p="http://schemas.openxmlformats.org/presentationml/2006/main">
-  <p:cSld>
-    <p:spTree>
-      <p:nvGrpSpPr>
-        <p:cNvPr id="1" name=""/>
-        <p:cNvGrpSpPr/>
-        <p:nvPr/>
-      </p:nvGrpSpPr>
-      <p:grpSpPr>
-        <a:xfrm>
-          <a:off x="0" y="0"/>
-          <a:ext cx="0" cy="0"/>
-          <a:chOff x="0" y="0"/>
-          <a:chExt cx="0" cy="0"/>
-        </a:xfrm>
-      </p:grpSpPr>
-      <p:sp>
-        <p:nvSpPr>
-          <p:cNvPr id="2" name="Title 1"/>
-          <p:cNvSpPr>
-            <a:spLocks noGrp="1"/>
-          </p:cNvSpPr>
-          <p:nvPr>
-            <p:ph type="title"/>
-          </p:nvPr>
-        </p:nvSpPr>
-        <p:spPr/>
-        <p:txBody>
-          <a:bodyPr/>
-          <a:lstStyle/>
-          <a:p>
-            <a:r>
-              <a:rPr lang="en-US" dirty="0" smtClean="0"/>
-              <a:t>Uses</a:t>
-            </a:r>
-            <a:endParaRPr lang="en-US" dirty="0"/>
-          </a:p>
-        </p:txBody>
-      </p:sp>
-      <p:sp>
-        <p:nvSpPr>
-          <p:cNvPr id="3" name="Content Placeholder 2"/>
-          <p:cNvSpPr>
-            <a:spLocks noGrp="1"/>
-          </p:cNvSpPr>
-          <p:nvPr>
-            <p:ph idx="1"/>
-          </p:nvPr>
-        </p:nvSpPr>
-        <p:spPr/>
-        <p:txBody>
-          <a:bodyPr>
-            <a:normAutofit fontScale="92500" lnSpcReduction="10000"/>
-          </a:bodyPr>
-          <a:lstStyle/>
-          <a:p>
-            <a:r>
-              <a:rPr lang="en-US" dirty="0" smtClean="0"/>
-              <a:t>Walk into a room, motion sensor turns light on automatically</a:t>
-            </a:r>
-          </a:p>
-          <a:p>
-            <a:pPr lvl="1"/>
-            <a:r>
-              <a:rPr lang="en-US" dirty="0" smtClean="0"/>
-              <a:t>With rules you can set a switch to not respond to motion at certain times of day</a:t>
-            </a:r>
-          </a:p>
-          <a:p>
-            <a:r>
-              <a:rPr lang="en-US" dirty="0" smtClean="0"/>
-              <a:t>Going away on vacation, can set a schedule to turn on some house lights to deter robbers</a:t>
-            </a:r>
-          </a:p>
-          <a:p>
-            <a:r>
-              <a:rPr lang="en-US" dirty="0" smtClean="0"/>
-              <a:t>Turn off/on a light from your computer or phone anywhere</a:t>
-            </a:r>
-          </a:p>
-          <a:p>
-            <a:pPr lvl="1"/>
-            <a:r>
-              <a:rPr lang="en-US" dirty="0" smtClean="0"/>
-              <a:t>In bed</a:t>
-            </a:r>
-          </a:p>
-          <a:p>
-            <a:pPr lvl="1"/>
-            <a:r>
-              <a:rPr lang="en-US" dirty="0" smtClean="0"/>
-              <a:t>At work</a:t>
-            </a:r>
-          </a:p>
-          <a:p>
-            <a:pPr lvl="1"/>
-            <a:r>
-              <a:rPr lang="en-US" dirty="0" smtClean="0"/>
-              <a:t>At </a:t>
-            </a:r>
-            <a:r>
-              <a:rPr lang="en-US" dirty="0" err="1" smtClean="0"/>
-              <a:t>Conor</a:t>
-            </a:r>
-            <a:r>
-              <a:rPr lang="en-US" dirty="0" smtClean="0"/>
-              <a:t> Larkins</a:t>
-            </a:r>
-          </a:p>
-          <a:p>
-            <a:r>
-              <a:rPr lang="en-US" dirty="0" smtClean="0"/>
-              <a:t>Save on your electric bill by having your lights turn off after time intervals or certain times of day</a:t>
-            </a:r>
-            <a:endParaRPr lang="en-US" dirty="0"/>
-          </a:p>
-        </p:txBody>
-      </p:sp>
-    </p:spTree>
-    <p:extLst>
-      <p:ext uri="{BB962C8B-B14F-4D97-AF65-F5344CB8AC3E}">
-        <p14:creationId xmlns:p14="http://schemas.microsoft.com/office/powerpoint/2010/main" val="2335861722"/>
-      </p:ext>
-    </p:extLst>
-  </p:cSld>
-  <p:clrMapOvr>
-    <a:masterClrMapping/>
-  </p:clrMapOvr>
-  <p:timing>
-    <p:tnLst>
-      <p:par>
-        <p:cTn id="1" dur="indefinite" restart="never" nodeType="tmRoot"/>
-      </p:par>
-    </p:tnLst>
-  </p:timing>
-</p:sld>
-</file>
-
-<file path=ppt/slides/slide5.xml><?xml version="1.0" encoding="utf-8"?>
 <p:sld xmlns:a="http://schemas.openxmlformats.org/drawingml/2006/main" xmlns:r="http://schemas.openxmlformats.org/officeDocument/2006/relationships" xmlns:p="http://schemas.openxmlformats.org/presentationml/2006/main">
   <p:cSld>
     <p:spTree>
@@ -7853,7 +8682,7 @@
 </p:sld>
 </file>
 
-<file path=ppt/slides/slide6.xml><?xml version="1.0" encoding="utf-8"?>
+<file path=ppt/slides/slide5.xml><?xml version="1.0" encoding="utf-8"?>
 <p:sld xmlns:a="http://schemas.openxmlformats.org/drawingml/2006/main" xmlns:r="http://schemas.openxmlformats.org/officeDocument/2006/relationships" xmlns:p="http://schemas.openxmlformats.org/presentationml/2006/main">
   <p:cSld>
     <p:spTree>
@@ -7967,7 +8796,7 @@
 </p:sld>
 </file>
 
-<file path=ppt/slides/slide7.xml><?xml version="1.0" encoding="utf-8"?>
+<file path=ppt/slides/slide6.xml><?xml version="1.0" encoding="utf-8"?>
 <p:sld xmlns:a="http://schemas.openxmlformats.org/drawingml/2006/main" xmlns:r="http://schemas.openxmlformats.org/officeDocument/2006/relationships" xmlns:p="http://schemas.openxmlformats.org/presentationml/2006/main">
   <p:cSld>
     <p:spTree>
@@ -8081,6 +8910,66 @@
 </p:sld>
 </file>
 
+<file path=ppt/slides/slide7.xml><?xml version="1.0" encoding="utf-8"?>
+<p:sld xmlns:a="http://schemas.openxmlformats.org/drawingml/2006/main" xmlns:r="http://schemas.openxmlformats.org/officeDocument/2006/relationships" xmlns:p="http://schemas.openxmlformats.org/presentationml/2006/main">
+  <p:cSld>
+    <p:spTree>
+      <p:nvGrpSpPr>
+        <p:cNvPr id="1" name=""/>
+        <p:cNvGrpSpPr/>
+        <p:nvPr/>
+      </p:nvGrpSpPr>
+      <p:grpSpPr>
+        <a:xfrm>
+          <a:off x="0" y="0"/>
+          <a:ext cx="0" cy="0"/>
+          <a:chOff x="0" y="0"/>
+          <a:chExt cx="0" cy="0"/>
+        </a:xfrm>
+      </p:grpSpPr>
+      <p:sp>
+        <p:nvSpPr>
+          <p:cNvPr id="2" name="Title 1"/>
+          <p:cNvSpPr>
+            <a:spLocks noGrp="1"/>
+          </p:cNvSpPr>
+          <p:nvPr>
+            <p:ph type="title"/>
+          </p:nvPr>
+        </p:nvSpPr>
+        <p:spPr/>
+        <p:txBody>
+          <a:bodyPr/>
+          <a:lstStyle/>
+          <a:p>
+            <a:r>
+              <a:rPr lang="en-US" dirty="0" smtClean="0"/>
+              <a:t>Build Process</a:t>
+            </a:r>
+            <a:endParaRPr lang="en-US" dirty="0"/>
+          </a:p>
+        </p:txBody>
+      </p:sp>
+    </p:spTree>
+    <p:extLst>
+      <p:ext uri="{BB962C8B-B14F-4D97-AF65-F5344CB8AC3E}">
+        <p14:creationId xmlns:p14="http://schemas.microsoft.com/office/powerpoint/2010/main" val="3881248493"/>
+      </p:ext>
+    </p:extLst>
+  </p:cSld>
+  <p:clrMapOvr>
+    <a:masterClrMapping/>
+  </p:clrMapOvr>
+  <p:timing>
+    <p:tnLst>
+      <p:par>
+        <p:cTn id="1" dur="indefinite" restart="never" nodeType="tmRoot"/>
+      </p:par>
+    </p:tnLst>
+  </p:timing>
+</p:sld>
+</file>
+
 <file path=ppt/slides/slide8.xml><?xml version="1.0" encoding="utf-8"?>
 <p:sld xmlns:a="http://schemas.openxmlformats.org/drawingml/2006/main" xmlns:r="http://schemas.openxmlformats.org/officeDocument/2006/relationships" xmlns:p="http://schemas.openxmlformats.org/presentationml/2006/main">
   <p:cSld>
@@ -8098,33 +8987,9 @@
           <a:chExt cx="0" cy="0"/>
         </a:xfrm>
       </p:grpSpPr>
-      <p:pic>
-        <p:nvPicPr>
-          <p:cNvPr id="9" name="Picture 8"/>
-          <p:cNvPicPr>
-            <a:picLocks noChangeAspect="1"/>
-          </p:cNvPicPr>
-          <p:nvPr/>
-        </p:nvPicPr>
-        <p:blipFill>
-          <a:blip r:embed="rId3"/>
-          <a:stretch>
-            <a:fillRect/>
-          </a:stretch>
-        </p:blipFill>
-        <p:spPr>
-          <a:xfrm>
-            <a:off x="0" y="1365854"/>
-            <a:ext cx="9144000" cy="5549403"/>
-          </a:xfrm>
-          <a:prstGeom prst="rect">
-            <a:avLst/>
-          </a:prstGeom>
-        </p:spPr>
-      </p:pic>
-      <p:sp>
-        <p:nvSpPr>
-          <p:cNvPr id="11" name="Title 1"/>
+      <p:sp>
+        <p:nvSpPr>
+          <p:cNvPr id="2" name="Title 1"/>
           <p:cNvSpPr>
             <a:spLocks noGrp="1"/>
           </p:cNvSpPr>
@@ -8132,19 +8997,14 @@
             <p:ph type="title"/>
           </p:nvPr>
         </p:nvSpPr>
-        <p:spPr>
-          <a:xfrm>
-            <a:off x="685800" y="121023"/>
-            <a:ext cx="7770813" cy="1429871"/>
-          </a:xfrm>
-        </p:spPr>
+        <p:spPr/>
         <p:txBody>
           <a:bodyPr/>
           <a:lstStyle/>
           <a:p>
             <a:r>
               <a:rPr lang="en-US" dirty="0" smtClean="0"/>
-              <a:t>Software Layout</a:t>
+              <a:t>Firmware</a:t>
             </a:r>
             <a:endParaRPr lang="en-US" dirty="0"/>
           </a:p>
@@ -8152,1742 +9012,106 @@
       </p:sp>
       <p:sp>
         <p:nvSpPr>
-          <p:cNvPr id="2" name="Rounded Rectangle 1"/>
-          <p:cNvSpPr/>
-          <p:nvPr/>
-        </p:nvSpPr>
-        <p:spPr>
-          <a:xfrm>
-            <a:off x="816746" y="2090554"/>
-            <a:ext cx="1069759" cy="998875"/>
-          </a:xfrm>
-          <a:prstGeom prst="roundRect">
-            <a:avLst/>
-          </a:prstGeom>
-          <a:solidFill>
-            <a:srgbClr val="407320">
-              <a:alpha val="0"/>
-            </a:srgbClr>
-          </a:solidFill>
-          <a:ln w="38100">
-            <a:solidFill>
-              <a:srgbClr val="FF0000"/>
-            </a:solidFill>
-          </a:ln>
-        </p:spPr>
-        <p:style>
-          <a:lnRef idx="1">
-            <a:schemeClr val="accent1"/>
-          </a:lnRef>
-          <a:fillRef idx="3">
-            <a:schemeClr val="accent1"/>
-          </a:fillRef>
-          <a:effectRef idx="2">
-            <a:schemeClr val="accent1"/>
-          </a:effectRef>
-          <a:fontRef idx="minor">
-            <a:schemeClr val="lt1"/>
-          </a:fontRef>
-        </p:style>
-        <p:txBody>
-          <a:bodyPr rtlCol="0" anchor="ctr"/>
+          <p:cNvPr id="3" name="Content Placeholder 2"/>
+          <p:cNvSpPr>
+            <a:spLocks noGrp="1"/>
+          </p:cNvSpPr>
+          <p:nvPr>
+            <p:ph idx="1"/>
+          </p:nvPr>
+        </p:nvSpPr>
+        <p:spPr/>
+        <p:txBody>
+          <a:bodyPr>
+            <a:normAutofit fontScale="92500" lnSpcReduction="10000"/>
+          </a:bodyPr>
           <a:lstStyle/>
           <a:p>
-            <a:pPr algn="ctr"/>
-            <a:endParaRPr lang="en-US"/>
-          </a:p>
-        </p:txBody>
-      </p:sp>
-      <p:sp>
-        <p:nvSpPr>
-          <p:cNvPr id="6" name="Rounded Rectangle 5"/>
-          <p:cNvSpPr/>
-          <p:nvPr/>
-        </p:nvSpPr>
-        <p:spPr>
-          <a:xfrm>
-            <a:off x="766456" y="3832999"/>
-            <a:ext cx="1069759" cy="615114"/>
-          </a:xfrm>
-          <a:prstGeom prst="roundRect">
-            <a:avLst/>
-          </a:prstGeom>
-          <a:solidFill>
-            <a:srgbClr val="407320">
-              <a:alpha val="0"/>
-            </a:srgbClr>
-          </a:solidFill>
-          <a:ln w="38100">
-            <a:solidFill>
-              <a:srgbClr val="FF0000"/>
-            </a:solidFill>
-          </a:ln>
-        </p:spPr>
-        <p:style>
-          <a:lnRef idx="1">
-            <a:schemeClr val="accent1"/>
-          </a:lnRef>
-          <a:fillRef idx="3">
-            <a:schemeClr val="accent1"/>
-          </a:fillRef>
-          <a:effectRef idx="2">
-            <a:schemeClr val="accent1"/>
-          </a:effectRef>
-          <a:fontRef idx="minor">
-            <a:schemeClr val="lt1"/>
-          </a:fontRef>
-        </p:style>
-        <p:txBody>
-          <a:bodyPr rtlCol="0" anchor="ctr"/>
-          <a:lstStyle/>
-          <a:p>
-            <a:pPr algn="ctr"/>
-            <a:endParaRPr lang="en-US"/>
-          </a:p>
-        </p:txBody>
-      </p:sp>
-      <p:sp>
-        <p:nvSpPr>
-          <p:cNvPr id="7" name="Rounded Rectangle 6"/>
-          <p:cNvSpPr/>
-          <p:nvPr/>
-        </p:nvSpPr>
-        <p:spPr>
-          <a:xfrm>
-            <a:off x="2364192" y="2138450"/>
-            <a:ext cx="3227714" cy="821013"/>
-          </a:xfrm>
-          <a:prstGeom prst="roundRect">
-            <a:avLst/>
-          </a:prstGeom>
-          <a:solidFill>
-            <a:srgbClr val="407320">
-              <a:alpha val="0"/>
-            </a:srgbClr>
-          </a:solidFill>
-          <a:ln w="38100">
-            <a:solidFill>
-              <a:srgbClr val="FF0000"/>
-            </a:solidFill>
-          </a:ln>
-        </p:spPr>
-        <p:style>
-          <a:lnRef idx="1">
-            <a:schemeClr val="accent1"/>
-          </a:lnRef>
-          <a:fillRef idx="3">
-            <a:schemeClr val="accent1"/>
-          </a:fillRef>
-          <a:effectRef idx="2">
-            <a:schemeClr val="accent1"/>
-          </a:effectRef>
-          <a:fontRef idx="minor">
-            <a:schemeClr val="lt1"/>
-          </a:fontRef>
-        </p:style>
-        <p:txBody>
-          <a:bodyPr rtlCol="0" anchor="ctr"/>
-          <a:lstStyle/>
-          <a:p>
-            <a:pPr algn="ctr"/>
-            <a:endParaRPr lang="en-US"/>
-          </a:p>
-        </p:txBody>
-      </p:sp>
-      <p:sp>
-        <p:nvSpPr>
-          <p:cNvPr id="10" name="Rounded Rectangle 9"/>
-          <p:cNvSpPr/>
-          <p:nvPr/>
-        </p:nvSpPr>
-        <p:spPr>
-          <a:xfrm>
-            <a:off x="3019027" y="4781812"/>
-            <a:ext cx="1069759" cy="615114"/>
-          </a:xfrm>
-          <a:prstGeom prst="roundRect">
-            <a:avLst/>
-          </a:prstGeom>
-          <a:solidFill>
-            <a:srgbClr val="407320">
-              <a:alpha val="0"/>
-            </a:srgbClr>
-          </a:solidFill>
-          <a:ln w="38100">
-            <a:solidFill>
-              <a:srgbClr val="FF0000"/>
-            </a:solidFill>
-          </a:ln>
-        </p:spPr>
-        <p:style>
-          <a:lnRef idx="1">
-            <a:schemeClr val="accent1"/>
-          </a:lnRef>
-          <a:fillRef idx="3">
-            <a:schemeClr val="accent1"/>
-          </a:fillRef>
-          <a:effectRef idx="2">
-            <a:schemeClr val="accent1"/>
-          </a:effectRef>
-          <a:fontRef idx="minor">
-            <a:schemeClr val="lt1"/>
-          </a:fontRef>
-        </p:style>
-        <p:txBody>
-          <a:bodyPr rtlCol="0" anchor="ctr"/>
-          <a:lstStyle/>
-          <a:p>
-            <a:pPr algn="ctr"/>
-            <a:endParaRPr lang="en-US"/>
-          </a:p>
-        </p:txBody>
-      </p:sp>
-      <p:sp>
-        <p:nvSpPr>
-          <p:cNvPr id="12" name="Rounded Rectangle 11"/>
-          <p:cNvSpPr/>
-          <p:nvPr/>
-        </p:nvSpPr>
-        <p:spPr>
-          <a:xfrm>
-            <a:off x="8074241" y="4911598"/>
-            <a:ext cx="1069759" cy="615114"/>
-          </a:xfrm>
-          <a:prstGeom prst="roundRect">
-            <a:avLst/>
-          </a:prstGeom>
-          <a:solidFill>
-            <a:srgbClr val="407320">
-              <a:alpha val="0"/>
-            </a:srgbClr>
-          </a:solidFill>
-          <a:ln w="38100">
-            <a:solidFill>
-              <a:srgbClr val="FF0000"/>
-            </a:solidFill>
-          </a:ln>
-        </p:spPr>
-        <p:style>
-          <a:lnRef idx="1">
-            <a:schemeClr val="accent1"/>
-          </a:lnRef>
-          <a:fillRef idx="3">
-            <a:schemeClr val="accent1"/>
-          </a:fillRef>
-          <a:effectRef idx="2">
-            <a:schemeClr val="accent1"/>
-          </a:effectRef>
-          <a:fontRef idx="minor">
-            <a:schemeClr val="lt1"/>
-          </a:fontRef>
-        </p:style>
-        <p:txBody>
-          <a:bodyPr rtlCol="0" anchor="ctr"/>
-          <a:lstStyle/>
-          <a:p>
-            <a:pPr algn="ctr"/>
-            <a:endParaRPr lang="en-US"/>
-          </a:p>
-        </p:txBody>
-      </p:sp>
-      <p:sp>
-        <p:nvSpPr>
-          <p:cNvPr id="13" name="Rounded Rectangle 12"/>
-          <p:cNvSpPr/>
-          <p:nvPr/>
-        </p:nvSpPr>
-        <p:spPr>
-          <a:xfrm>
-            <a:off x="5057026" y="4140556"/>
-            <a:ext cx="1069759" cy="615114"/>
-          </a:xfrm>
-          <a:prstGeom prst="roundRect">
-            <a:avLst/>
-          </a:prstGeom>
-          <a:solidFill>
-            <a:srgbClr val="407320">
-              <a:alpha val="0"/>
-            </a:srgbClr>
-          </a:solidFill>
-          <a:ln w="38100">
-            <a:solidFill>
-              <a:srgbClr val="FF0000"/>
-            </a:solidFill>
-          </a:ln>
-        </p:spPr>
-        <p:style>
-          <a:lnRef idx="1">
-            <a:schemeClr val="accent1"/>
-          </a:lnRef>
-          <a:fillRef idx="3">
-            <a:schemeClr val="accent1"/>
-          </a:fillRef>
-          <a:effectRef idx="2">
-            <a:schemeClr val="accent1"/>
-          </a:effectRef>
-          <a:fontRef idx="minor">
-            <a:schemeClr val="lt1"/>
-          </a:fontRef>
-        </p:style>
-        <p:txBody>
-          <a:bodyPr rtlCol="0" anchor="ctr"/>
-          <a:lstStyle/>
-          <a:p>
-            <a:pPr algn="ctr"/>
-            <a:endParaRPr lang="en-US"/>
-          </a:p>
-        </p:txBody>
-      </p:sp>
-      <p:sp>
-        <p:nvSpPr>
-          <p:cNvPr id="14" name="Rounded Rectangle 13"/>
-          <p:cNvSpPr/>
-          <p:nvPr/>
-        </p:nvSpPr>
-        <p:spPr>
-          <a:xfrm>
-            <a:off x="3910614" y="3013025"/>
-            <a:ext cx="1069759" cy="615114"/>
-          </a:xfrm>
-          <a:prstGeom prst="roundRect">
-            <a:avLst/>
-          </a:prstGeom>
-          <a:solidFill>
-            <a:srgbClr val="407320">
-              <a:alpha val="0"/>
-            </a:srgbClr>
-          </a:solidFill>
-          <a:ln w="38100">
-            <a:solidFill>
-              <a:srgbClr val="FF0000"/>
-            </a:solidFill>
-          </a:ln>
-        </p:spPr>
-        <p:style>
-          <a:lnRef idx="1">
-            <a:schemeClr val="accent1"/>
-          </a:lnRef>
-          <a:fillRef idx="3">
-            <a:schemeClr val="accent1"/>
-          </a:fillRef>
-          <a:effectRef idx="2">
-            <a:schemeClr val="accent1"/>
-          </a:effectRef>
-          <a:fontRef idx="minor">
-            <a:schemeClr val="lt1"/>
-          </a:fontRef>
-        </p:style>
-        <p:txBody>
-          <a:bodyPr rtlCol="0" anchor="ctr"/>
-          <a:lstStyle/>
-          <a:p>
-            <a:pPr algn="ctr"/>
-            <a:endParaRPr lang="en-US"/>
-          </a:p>
-        </p:txBody>
-      </p:sp>
-      <p:sp>
-        <p:nvSpPr>
-          <p:cNvPr id="15" name="Rounded Rectangle 14"/>
-          <p:cNvSpPr/>
-          <p:nvPr/>
-        </p:nvSpPr>
-        <p:spPr>
-          <a:xfrm>
-            <a:off x="3892041" y="3959357"/>
-            <a:ext cx="1069759" cy="615114"/>
-          </a:xfrm>
-          <a:prstGeom prst="roundRect">
-            <a:avLst/>
-          </a:prstGeom>
-          <a:solidFill>
-            <a:srgbClr val="407320">
-              <a:alpha val="0"/>
-            </a:srgbClr>
-          </a:solidFill>
-          <a:ln w="38100">
-            <a:solidFill>
-              <a:srgbClr val="FF0000"/>
-            </a:solidFill>
-          </a:ln>
-        </p:spPr>
-        <p:style>
-          <a:lnRef idx="1">
-            <a:schemeClr val="accent1"/>
-          </a:lnRef>
-          <a:fillRef idx="3">
-            <a:schemeClr val="accent1"/>
-          </a:fillRef>
-          <a:effectRef idx="2">
-            <a:schemeClr val="accent1"/>
-          </a:effectRef>
-          <a:fontRef idx="minor">
-            <a:schemeClr val="lt1"/>
-          </a:fontRef>
-        </p:style>
-        <p:txBody>
-          <a:bodyPr rtlCol="0" anchor="ctr"/>
-          <a:lstStyle/>
-          <a:p>
-            <a:pPr algn="ctr"/>
-            <a:endParaRPr lang="en-US"/>
-          </a:p>
-        </p:txBody>
-      </p:sp>
-      <p:pic>
-        <p:nvPicPr>
-          <p:cNvPr id="4" name="Picture 3"/>
-          <p:cNvPicPr>
-            <a:picLocks noChangeAspect="1"/>
-          </p:cNvPicPr>
-          <p:nvPr/>
-        </p:nvPicPr>
-        <p:blipFill>
-          <a:blip r:embed="rId4" cstate="email">
-            <a:extLst>
-              <a:ext uri="{28A0092B-C50C-407E-A947-70E740481C1C}">
-                <a14:useLocalDpi xmlns:a14="http://schemas.microsoft.com/office/drawing/2010/main" val="0"/>
-              </a:ext>
-            </a:extLst>
-          </a:blip>
-          <a:stretch>
-            <a:fillRect/>
-          </a:stretch>
-        </p:blipFill>
-        <p:spPr>
-          <a:xfrm>
-            <a:off x="7406672" y="2874864"/>
-            <a:ext cx="2077275" cy="2077275"/>
-          </a:xfrm>
-          <a:prstGeom prst="rect">
-            <a:avLst/>
-          </a:prstGeom>
-        </p:spPr>
-      </p:pic>
-      <p:sp>
-        <p:nvSpPr>
-          <p:cNvPr id="5" name="Rectangle 4"/>
-          <p:cNvSpPr/>
-          <p:nvPr/>
-        </p:nvSpPr>
-        <p:spPr>
-          <a:xfrm>
-            <a:off x="753453" y="2077451"/>
-            <a:ext cx="6423069" cy="1718825"/>
-          </a:xfrm>
-          <a:prstGeom prst="rect">
-            <a:avLst/>
-          </a:prstGeom>
-        </p:spPr>
-        <p:style>
-          <a:lnRef idx="1">
-            <a:schemeClr val="accent6"/>
-          </a:lnRef>
-          <a:fillRef idx="2">
-            <a:schemeClr val="accent6"/>
-          </a:fillRef>
-          <a:effectRef idx="1">
-            <a:schemeClr val="accent6"/>
-          </a:effectRef>
-          <a:fontRef idx="minor">
-            <a:schemeClr val="dk1"/>
-          </a:fontRef>
-        </p:style>
-        <p:txBody>
-          <a:bodyPr rtlCol="0" anchor="ctr"/>
-          <a:lstStyle/>
-          <a:p>
-            <a:r>
-              <a:rPr lang="en-US" dirty="0"/>
-              <a:t>Coffeescript (JS is the worst</a:t>
-            </a:r>
             <a:r>
               <a:rPr lang="en-US" dirty="0" smtClean="0"/>
-              <a:t>)</a:t>
-            </a:r>
-          </a:p>
-          <a:p>
-            <a:pPr marL="285750" indent="-285750">
-              <a:buFont typeface="Arial" panose="020B0604020202020204" pitchFamily="34" charset="0"/>
-              <a:buChar char="•"/>
-            </a:pPr>
+              <a:t>Developed with Arduino IDE</a:t>
+            </a:r>
+          </a:p>
+          <a:p>
+            <a:pPr lvl="1"/>
             <a:r>
               <a:rPr lang="en-US" dirty="0" smtClean="0"/>
-              <a:t>Angular</a:t>
-            </a:r>
-          </a:p>
-          <a:p>
-            <a:pPr marL="285750" indent="-285750">
-              <a:buFont typeface="Arial" panose="020B0604020202020204" pitchFamily="34" charset="0"/>
-              <a:buChar char="•"/>
-            </a:pPr>
+              <a:t>C/C++ Based</a:t>
+            </a:r>
+          </a:p>
+          <a:p>
             <a:r>
               <a:rPr lang="en-US" dirty="0" smtClean="0"/>
-              <a:t>Ajax</a:t>
+              <a:t>Built in </a:t>
+            </a:r>
+            <a:r>
+              <a:rPr lang="en-US" dirty="0" err="1" smtClean="0"/>
+              <a:t>WiFi</a:t>
+            </a:r>
+            <a:r>
+              <a:rPr lang="en-US" dirty="0" smtClean="0"/>
+              <a:t> to board utilize multiple user libraries</a:t>
+            </a:r>
+          </a:p>
+          <a:p>
+            <a:r>
+              <a:rPr lang="en-US" dirty="0" smtClean="0"/>
+              <a:t>Digital control over all I/O such as:</a:t>
+            </a:r>
+          </a:p>
+          <a:p>
+            <a:pPr lvl="1"/>
+            <a:r>
+              <a:rPr lang="en-US" dirty="0" smtClean="0"/>
+              <a:t>Relay to control lights</a:t>
+            </a:r>
+          </a:p>
+          <a:p>
+            <a:pPr lvl="1"/>
+            <a:r>
+              <a:rPr lang="en-US" dirty="0" smtClean="0"/>
+              <a:t>Motion Control</a:t>
+            </a:r>
+          </a:p>
+          <a:p>
+            <a:pPr lvl="1"/>
+            <a:r>
+              <a:rPr lang="en-US" dirty="0" smtClean="0"/>
+              <a:t>Manual Control</a:t>
+            </a:r>
+          </a:p>
+          <a:p>
+            <a:r>
+              <a:rPr lang="en-US" dirty="0" smtClean="0"/>
+              <a:t>Built in file system</a:t>
+            </a:r>
+          </a:p>
+          <a:p>
+            <a:pPr lvl="1"/>
+            <a:r>
+              <a:rPr lang="en-US" dirty="0" smtClean="0"/>
+              <a:t>Used to store files for backup, or hosting more advanced forms</a:t>
+            </a:r>
+          </a:p>
+          <a:p>
+            <a:r>
+              <a:rPr lang="en-US" dirty="0" smtClean="0"/>
+              <a:t>LUA and Micro Python interpreters for scripting</a:t>
             </a:r>
             <a:endParaRPr lang="en-US" dirty="0"/>
           </a:p>
         </p:txBody>
       </p:sp>
-      <p:sp>
-        <p:nvSpPr>
-          <p:cNvPr id="16" name="Rectangle 15"/>
-          <p:cNvSpPr/>
-          <p:nvPr/>
-        </p:nvSpPr>
-        <p:spPr>
-          <a:xfrm>
-            <a:off x="757846" y="3775764"/>
-            <a:ext cx="6423069" cy="1866647"/>
-          </a:xfrm>
-          <a:prstGeom prst="rect">
-            <a:avLst/>
-          </a:prstGeom>
-          <a:solidFill>
-            <a:schemeClr val="accent3">
-              <a:lumMod val="60000"/>
-              <a:lumOff val="40000"/>
-            </a:schemeClr>
-          </a:solidFill>
-        </p:spPr>
-        <p:style>
-          <a:lnRef idx="1">
-            <a:schemeClr val="accent6"/>
-          </a:lnRef>
-          <a:fillRef idx="2">
-            <a:schemeClr val="accent6"/>
-          </a:fillRef>
-          <a:effectRef idx="1">
-            <a:schemeClr val="accent6"/>
-          </a:effectRef>
-          <a:fontRef idx="minor">
-            <a:schemeClr val="dk1"/>
-          </a:fontRef>
-        </p:style>
-        <p:txBody>
-          <a:bodyPr rtlCol="0" anchor="ctr"/>
-          <a:lstStyle/>
-          <a:p>
-            <a:r>
-              <a:rPr lang="en-US" dirty="0" smtClean="0"/>
-              <a:t>Python</a:t>
-            </a:r>
-          </a:p>
-          <a:p>
-            <a:pPr marL="285750" indent="-285750">
-              <a:buFont typeface="Arial" panose="020B0604020202020204" pitchFamily="34" charset="0"/>
-              <a:buChar char="•"/>
-            </a:pPr>
-            <a:r>
-              <a:rPr lang="en-US" dirty="0" err="1" smtClean="0"/>
-              <a:t>Gunicorn</a:t>
-            </a:r>
-            <a:endParaRPr lang="en-US" dirty="0" smtClean="0"/>
-          </a:p>
-          <a:p>
-            <a:pPr marL="285750" indent="-285750">
-              <a:buFont typeface="Arial" panose="020B0604020202020204" pitchFamily="34" charset="0"/>
-              <a:buChar char="•"/>
-            </a:pPr>
-            <a:r>
-              <a:rPr lang="en-US" dirty="0" err="1" smtClean="0"/>
-              <a:t>SQLAlchemy</a:t>
-            </a:r>
-            <a:endParaRPr lang="en-US" dirty="0" smtClean="0"/>
-          </a:p>
-          <a:p>
-            <a:pPr marL="285750" indent="-285750">
-              <a:buFont typeface="Arial" panose="020B0604020202020204" pitchFamily="34" charset="0"/>
-              <a:buChar char="•"/>
-            </a:pPr>
-            <a:r>
-              <a:rPr lang="en-US" dirty="0" smtClean="0"/>
-              <a:t>Celery</a:t>
-            </a:r>
-          </a:p>
-        </p:txBody>
-      </p:sp>
-      <p:sp>
-        <p:nvSpPr>
-          <p:cNvPr id="17" name="Rectangle 16"/>
-          <p:cNvSpPr/>
-          <p:nvPr/>
-        </p:nvSpPr>
-        <p:spPr>
-          <a:xfrm>
-            <a:off x="762180" y="5637906"/>
-            <a:ext cx="6423069" cy="784561"/>
-          </a:xfrm>
-          <a:prstGeom prst="rect">
-            <a:avLst/>
-          </a:prstGeom>
-          <a:solidFill>
-            <a:schemeClr val="accent1">
-              <a:lumMod val="60000"/>
-              <a:lumOff val="40000"/>
-            </a:schemeClr>
-          </a:solidFill>
-        </p:spPr>
-        <p:style>
-          <a:lnRef idx="1">
-            <a:schemeClr val="accent6"/>
-          </a:lnRef>
-          <a:fillRef idx="2">
-            <a:schemeClr val="accent6"/>
-          </a:fillRef>
-          <a:effectRef idx="1">
-            <a:schemeClr val="accent6"/>
-          </a:effectRef>
-          <a:fontRef idx="minor">
-            <a:schemeClr val="dk1"/>
-          </a:fontRef>
-        </p:style>
-        <p:txBody>
-          <a:bodyPr rtlCol="0" anchor="ctr"/>
-          <a:lstStyle/>
-          <a:p>
-            <a:pPr marL="285750" indent="-285750">
-              <a:buFont typeface="Arial" panose="020B0604020202020204" pitchFamily="34" charset="0"/>
-              <a:buChar char="•"/>
-            </a:pPr>
-            <a:r>
-              <a:rPr lang="en-US" dirty="0" smtClean="0"/>
-              <a:t>PostgreSQL</a:t>
-            </a:r>
-          </a:p>
-        </p:txBody>
-      </p:sp>
-      <p:pic>
-        <p:nvPicPr>
-          <p:cNvPr id="3" name="Picture 2"/>
-          <p:cNvPicPr>
-            <a:picLocks noChangeAspect="1"/>
-          </p:cNvPicPr>
-          <p:nvPr/>
-        </p:nvPicPr>
-        <p:blipFill>
-          <a:blip r:embed="rId5" cstate="email">
-            <a:extLst>
-              <a:ext uri="{28A0092B-C50C-407E-A947-70E740481C1C}">
-                <a14:useLocalDpi xmlns:a14="http://schemas.microsoft.com/office/drawing/2010/main" val="0"/>
-              </a:ext>
-            </a:extLst>
-          </a:blip>
-          <a:stretch>
-            <a:fillRect/>
-          </a:stretch>
-        </p:blipFill>
-        <p:spPr>
-          <a:xfrm>
-            <a:off x="2837817" y="2367195"/>
-            <a:ext cx="2651765" cy="1881600"/>
-          </a:xfrm>
-          <a:prstGeom prst="rect">
-            <a:avLst/>
-          </a:prstGeom>
-        </p:spPr>
-      </p:pic>
-      <p:pic>
-        <p:nvPicPr>
-          <p:cNvPr id="8" name="Picture 7"/>
-          <p:cNvPicPr>
-            <a:picLocks noChangeAspect="1"/>
-          </p:cNvPicPr>
-          <p:nvPr/>
-        </p:nvPicPr>
-        <p:blipFill>
-          <a:blip r:embed="rId6" cstate="email">
-            <a:extLst>
-              <a:ext uri="{28A0092B-C50C-407E-A947-70E740481C1C}">
-                <a14:useLocalDpi xmlns:a14="http://schemas.microsoft.com/office/drawing/2010/main" val="0"/>
-              </a:ext>
-            </a:extLst>
-          </a:blip>
-          <a:stretch>
-            <a:fillRect/>
-          </a:stretch>
-        </p:blipFill>
-        <p:spPr>
-          <a:xfrm>
-            <a:off x="2122027" y="3876331"/>
-            <a:ext cx="2819924" cy="1472492"/>
-          </a:xfrm>
-          <a:prstGeom prst="rect">
-            <a:avLst/>
-          </a:prstGeom>
-        </p:spPr>
-      </p:pic>
     </p:spTree>
     <p:extLst>
       <p:ext uri="{BB962C8B-B14F-4D97-AF65-F5344CB8AC3E}">
-        <p14:creationId xmlns:p14="http://schemas.microsoft.com/office/powerpoint/2010/main" val="803841954"/>
+        <p14:creationId xmlns:p14="http://schemas.microsoft.com/office/powerpoint/2010/main" val="1231492197"/>
       </p:ext>
     </p:extLst>
   </p:cSld>
   <p:clrMapOvr>
     <a:masterClrMapping/>
   </p:clrMapOvr>
-  <mc:AlternateContent xmlns:mc="http://schemas.openxmlformats.org/markup-compatibility/2006" xmlns:p14="http://schemas.microsoft.com/office/powerpoint/2010/main">
-    <mc:Choice Requires="p14">
-      <p:transition p14:dur="0"/>
-    </mc:Choice>
-    <mc:Fallback xmlns="">
-      <p:transition/>
-    </mc:Fallback>
-  </mc:AlternateContent>
-  <p:timing>
-    <p:tnLst>
-      <p:par>
-        <p:cTn id="1" dur="indefinite" restart="never" nodeType="tmRoot">
-          <p:childTnLst>
-            <p:seq concurrent="1" nextAc="seek">
-              <p:cTn id="2" dur="indefinite" nodeType="mainSeq">
-                <p:childTnLst>
-                  <p:par>
-                    <p:cTn id="3" fill="hold">
-                      <p:stCondLst>
-                        <p:cond delay="indefinite"/>
-                      </p:stCondLst>
-                      <p:childTnLst>
-                        <p:par>
-                          <p:cTn id="4" fill="hold">
-                            <p:stCondLst>
-                              <p:cond delay="0"/>
-                            </p:stCondLst>
-                            <p:childTnLst>
-                              <p:par>
-                                <p:cTn id="5" presetID="1" presetClass="entr" presetSubtype="0" fill="hold" grpId="0" nodeType="clickEffect">
-                                  <p:stCondLst>
-                                    <p:cond delay="0"/>
-                                  </p:stCondLst>
-                                  <p:childTnLst>
-                                    <p:set>
-                                      <p:cBhvr>
-                                        <p:cTn id="6" dur="1" fill="hold">
-                                          <p:stCondLst>
-                                            <p:cond delay="0"/>
-                                          </p:stCondLst>
-                                        </p:cTn>
-                                        <p:tgtEl>
-                                          <p:spTgt spid="2"/>
-                                        </p:tgtEl>
-                                        <p:attrNameLst>
-                                          <p:attrName>style.visibility</p:attrName>
-                                        </p:attrNameLst>
-                                      </p:cBhvr>
-                                      <p:to>
-                                        <p:strVal val="visible"/>
-                                      </p:to>
-                                    </p:set>
-                                  </p:childTnLst>
-                                </p:cTn>
-                              </p:par>
-                              <p:par>
-                                <p:cTn id="7" presetID="1" presetClass="entr" presetSubtype="0" fill="hold" nodeType="withEffect">
-                                  <p:stCondLst>
-                                    <p:cond delay="0"/>
-                                  </p:stCondLst>
-                                  <p:childTnLst>
-                                    <p:set>
-                                      <p:cBhvr>
-                                        <p:cTn id="8" dur="1" fill="hold">
-                                          <p:stCondLst>
-                                            <p:cond delay="0"/>
-                                          </p:stCondLst>
-                                        </p:cTn>
-                                        <p:tgtEl>
-                                          <p:spTgt spid="3"/>
-                                        </p:tgtEl>
-                                        <p:attrNameLst>
-                                          <p:attrName>style.visibility</p:attrName>
-                                        </p:attrNameLst>
-                                      </p:cBhvr>
-                                      <p:to>
-                                        <p:strVal val="visible"/>
-                                      </p:to>
-                                    </p:set>
-                                  </p:childTnLst>
-                                </p:cTn>
-                              </p:par>
-                            </p:childTnLst>
-                          </p:cTn>
-                        </p:par>
-                      </p:childTnLst>
-                    </p:cTn>
-                  </p:par>
-                  <p:par>
-                    <p:cTn id="9" fill="hold">
-                      <p:stCondLst>
-                        <p:cond delay="indefinite"/>
-                      </p:stCondLst>
-                      <p:childTnLst>
-                        <p:par>
-                          <p:cTn id="10" fill="hold">
-                            <p:stCondLst>
-                              <p:cond delay="0"/>
-                            </p:stCondLst>
-                            <p:childTnLst>
-                              <p:par>
-                                <p:cTn id="11" presetID="1" presetClass="entr" presetSubtype="0" fill="hold" grpId="0" nodeType="clickEffect">
-                                  <p:stCondLst>
-                                    <p:cond delay="0"/>
-                                  </p:stCondLst>
-                                  <p:childTnLst>
-                                    <p:set>
-                                      <p:cBhvr>
-                                        <p:cTn id="12" dur="1" fill="hold">
-                                          <p:stCondLst>
-                                            <p:cond delay="0"/>
-                                          </p:stCondLst>
-                                        </p:cTn>
-                                        <p:tgtEl>
-                                          <p:spTgt spid="6"/>
-                                        </p:tgtEl>
-                                        <p:attrNameLst>
-                                          <p:attrName>style.visibility</p:attrName>
-                                        </p:attrNameLst>
-                                      </p:cBhvr>
-                                      <p:to>
-                                        <p:strVal val="visible"/>
-                                      </p:to>
-                                    </p:set>
-                                  </p:childTnLst>
-                                </p:cTn>
-                              </p:par>
-                              <p:par>
-                                <p:cTn id="13" presetID="1" presetClass="exit" presetSubtype="0" fill="hold" grpId="1" nodeType="withEffect">
-                                  <p:stCondLst>
-                                    <p:cond delay="0"/>
-                                  </p:stCondLst>
-                                  <p:childTnLst>
-                                    <p:set>
-                                      <p:cBhvr>
-                                        <p:cTn id="14" dur="1" fill="hold">
-                                          <p:stCondLst>
-                                            <p:cond delay="0"/>
-                                          </p:stCondLst>
-                                        </p:cTn>
-                                        <p:tgtEl>
-                                          <p:spTgt spid="2"/>
-                                        </p:tgtEl>
-                                        <p:attrNameLst>
-                                          <p:attrName>style.visibility</p:attrName>
-                                        </p:attrNameLst>
-                                      </p:cBhvr>
-                                      <p:to>
-                                        <p:strVal val="hidden"/>
-                                      </p:to>
-                                    </p:set>
-                                  </p:childTnLst>
-                                </p:cTn>
-                              </p:par>
-                            </p:childTnLst>
-                          </p:cTn>
-                        </p:par>
-                      </p:childTnLst>
-                    </p:cTn>
-                  </p:par>
-                  <p:par>
-                    <p:cTn id="15" fill="hold">
-                      <p:stCondLst>
-                        <p:cond delay="indefinite"/>
-                      </p:stCondLst>
-                      <p:childTnLst>
-                        <p:par>
-                          <p:cTn id="16" fill="hold">
-                            <p:stCondLst>
-                              <p:cond delay="0"/>
-                            </p:stCondLst>
-                            <p:childTnLst>
-                              <p:par>
-                                <p:cTn id="17" presetID="1" presetClass="entr" presetSubtype="0" fill="hold" grpId="0" nodeType="clickEffect">
-                                  <p:stCondLst>
-                                    <p:cond delay="0"/>
-                                  </p:stCondLst>
-                                  <p:childTnLst>
-                                    <p:set>
-                                      <p:cBhvr>
-                                        <p:cTn id="18" dur="1" fill="hold">
-                                          <p:stCondLst>
-                                            <p:cond delay="0"/>
-                                          </p:stCondLst>
-                                        </p:cTn>
-                                        <p:tgtEl>
-                                          <p:spTgt spid="7"/>
-                                        </p:tgtEl>
-                                        <p:attrNameLst>
-                                          <p:attrName>style.visibility</p:attrName>
-                                        </p:attrNameLst>
-                                      </p:cBhvr>
-                                      <p:to>
-                                        <p:strVal val="visible"/>
-                                      </p:to>
-                                    </p:set>
-                                  </p:childTnLst>
-                                </p:cTn>
-                              </p:par>
-                              <p:par>
-                                <p:cTn id="19" presetID="1" presetClass="exit" presetSubtype="0" fill="hold" nodeType="withEffect">
-                                  <p:stCondLst>
-                                    <p:cond delay="0"/>
-                                  </p:stCondLst>
-                                  <p:childTnLst>
-                                    <p:set>
-                                      <p:cBhvr>
-                                        <p:cTn id="20" dur="1" fill="hold">
-                                          <p:stCondLst>
-                                            <p:cond delay="0"/>
-                                          </p:stCondLst>
-                                        </p:cTn>
-                                        <p:tgtEl>
-                                          <p:spTgt spid="3"/>
-                                        </p:tgtEl>
-                                        <p:attrNameLst>
-                                          <p:attrName>style.visibility</p:attrName>
-                                        </p:attrNameLst>
-                                      </p:cBhvr>
-                                      <p:to>
-                                        <p:strVal val="hidden"/>
-                                      </p:to>
-                                    </p:set>
-                                  </p:childTnLst>
-                                </p:cTn>
-                              </p:par>
-                              <p:par>
-                                <p:cTn id="21" presetID="1" presetClass="entr" presetSubtype="0" fill="hold" nodeType="withEffect">
-                                  <p:stCondLst>
-                                    <p:cond delay="0"/>
-                                  </p:stCondLst>
-                                  <p:childTnLst>
-                                    <p:set>
-                                      <p:cBhvr>
-                                        <p:cTn id="22" dur="1" fill="hold">
-                                          <p:stCondLst>
-                                            <p:cond delay="0"/>
-                                          </p:stCondLst>
-                                        </p:cTn>
-                                        <p:tgtEl>
-                                          <p:spTgt spid="8"/>
-                                        </p:tgtEl>
-                                        <p:attrNameLst>
-                                          <p:attrName>style.visibility</p:attrName>
-                                        </p:attrNameLst>
-                                      </p:cBhvr>
-                                      <p:to>
-                                        <p:strVal val="visible"/>
-                                      </p:to>
-                                    </p:set>
-                                  </p:childTnLst>
-                                </p:cTn>
-                              </p:par>
-                              <p:par>
-                                <p:cTn id="23" presetID="1" presetClass="exit" presetSubtype="0" fill="hold" grpId="1" nodeType="withEffect">
-                                  <p:stCondLst>
-                                    <p:cond delay="0"/>
-                                  </p:stCondLst>
-                                  <p:childTnLst>
-                                    <p:set>
-                                      <p:cBhvr>
-                                        <p:cTn id="24" dur="1" fill="hold">
-                                          <p:stCondLst>
-                                            <p:cond delay="0"/>
-                                          </p:stCondLst>
-                                        </p:cTn>
-                                        <p:tgtEl>
-                                          <p:spTgt spid="6"/>
-                                        </p:tgtEl>
-                                        <p:attrNameLst>
-                                          <p:attrName>style.visibility</p:attrName>
-                                        </p:attrNameLst>
-                                      </p:cBhvr>
-                                      <p:to>
-                                        <p:strVal val="hidden"/>
-                                      </p:to>
-                                    </p:set>
-                                  </p:childTnLst>
-                                </p:cTn>
-                              </p:par>
-                            </p:childTnLst>
-                          </p:cTn>
-                        </p:par>
-                      </p:childTnLst>
-                    </p:cTn>
-                  </p:par>
-                  <p:par>
-                    <p:cTn id="25" fill="hold">
-                      <p:stCondLst>
-                        <p:cond delay="indefinite"/>
-                      </p:stCondLst>
-                      <p:childTnLst>
-                        <p:par>
-                          <p:cTn id="26" fill="hold">
-                            <p:stCondLst>
-                              <p:cond delay="0"/>
-                            </p:stCondLst>
-                            <p:childTnLst>
-                              <p:par>
-                                <p:cTn id="27" presetID="1" presetClass="entr" presetSubtype="0" fill="hold" grpId="0" nodeType="clickEffect">
-                                  <p:stCondLst>
-                                    <p:cond delay="0"/>
-                                  </p:stCondLst>
-                                  <p:childTnLst>
-                                    <p:set>
-                                      <p:cBhvr>
-                                        <p:cTn id="28" dur="1" fill="hold">
-                                          <p:stCondLst>
-                                            <p:cond delay="0"/>
-                                          </p:stCondLst>
-                                        </p:cTn>
-                                        <p:tgtEl>
-                                          <p:spTgt spid="10"/>
-                                        </p:tgtEl>
-                                        <p:attrNameLst>
-                                          <p:attrName>style.visibility</p:attrName>
-                                        </p:attrNameLst>
-                                      </p:cBhvr>
-                                      <p:to>
-                                        <p:strVal val="visible"/>
-                                      </p:to>
-                                    </p:set>
-                                  </p:childTnLst>
-                                </p:cTn>
-                              </p:par>
-                              <p:par>
-                                <p:cTn id="29" presetID="1" presetClass="exit" presetSubtype="0" fill="hold" nodeType="withEffect">
-                                  <p:stCondLst>
-                                    <p:cond delay="0"/>
-                                  </p:stCondLst>
-                                  <p:childTnLst>
-                                    <p:set>
-                                      <p:cBhvr>
-                                        <p:cTn id="30" dur="1" fill="hold">
-                                          <p:stCondLst>
-                                            <p:cond delay="0"/>
-                                          </p:stCondLst>
-                                        </p:cTn>
-                                        <p:tgtEl>
-                                          <p:spTgt spid="8"/>
-                                        </p:tgtEl>
-                                        <p:attrNameLst>
-                                          <p:attrName>style.visibility</p:attrName>
-                                        </p:attrNameLst>
-                                      </p:cBhvr>
-                                      <p:to>
-                                        <p:strVal val="hidden"/>
-                                      </p:to>
-                                    </p:set>
-                                  </p:childTnLst>
-                                </p:cTn>
-                              </p:par>
-                              <p:par>
-                                <p:cTn id="31" presetID="1" presetClass="exit" presetSubtype="0" fill="hold" grpId="1" nodeType="withEffect">
-                                  <p:stCondLst>
-                                    <p:cond delay="0"/>
-                                  </p:stCondLst>
-                                  <p:childTnLst>
-                                    <p:set>
-                                      <p:cBhvr>
-                                        <p:cTn id="32" dur="1" fill="hold">
-                                          <p:stCondLst>
-                                            <p:cond delay="0"/>
-                                          </p:stCondLst>
-                                        </p:cTn>
-                                        <p:tgtEl>
-                                          <p:spTgt spid="7"/>
-                                        </p:tgtEl>
-                                        <p:attrNameLst>
-                                          <p:attrName>style.visibility</p:attrName>
-                                        </p:attrNameLst>
-                                      </p:cBhvr>
-                                      <p:to>
-                                        <p:strVal val="hidden"/>
-                                      </p:to>
-                                    </p:set>
-                                  </p:childTnLst>
-                                </p:cTn>
-                              </p:par>
-                            </p:childTnLst>
-                          </p:cTn>
-                        </p:par>
-                      </p:childTnLst>
-                    </p:cTn>
-                  </p:par>
-                  <p:par>
-                    <p:cTn id="33" fill="hold">
-                      <p:stCondLst>
-                        <p:cond delay="indefinite"/>
-                      </p:stCondLst>
-                      <p:childTnLst>
-                        <p:par>
-                          <p:cTn id="34" fill="hold">
-                            <p:stCondLst>
-                              <p:cond delay="0"/>
-                            </p:stCondLst>
-                            <p:childTnLst>
-                              <p:par>
-                                <p:cTn id="35" presetID="1" presetClass="entr" presetSubtype="0" fill="hold" grpId="0" nodeType="clickEffect">
-                                  <p:stCondLst>
-                                    <p:cond delay="0"/>
-                                  </p:stCondLst>
-                                  <p:childTnLst>
-                                    <p:set>
-                                      <p:cBhvr>
-                                        <p:cTn id="36" dur="1" fill="hold">
-                                          <p:stCondLst>
-                                            <p:cond delay="0"/>
-                                          </p:stCondLst>
-                                        </p:cTn>
-                                        <p:tgtEl>
-                                          <p:spTgt spid="12"/>
-                                        </p:tgtEl>
-                                        <p:attrNameLst>
-                                          <p:attrName>style.visibility</p:attrName>
-                                        </p:attrNameLst>
-                                      </p:cBhvr>
-                                      <p:to>
-                                        <p:strVal val="visible"/>
-                                      </p:to>
-                                    </p:set>
-                                  </p:childTnLst>
-                                </p:cTn>
-                              </p:par>
-                              <p:par>
-                                <p:cTn id="37" presetID="1" presetClass="exit" presetSubtype="0" fill="hold" grpId="1" nodeType="withEffect">
-                                  <p:stCondLst>
-                                    <p:cond delay="0"/>
-                                  </p:stCondLst>
-                                  <p:childTnLst>
-                                    <p:set>
-                                      <p:cBhvr>
-                                        <p:cTn id="38" dur="1" fill="hold">
-                                          <p:stCondLst>
-                                            <p:cond delay="0"/>
-                                          </p:stCondLst>
-                                        </p:cTn>
-                                        <p:tgtEl>
-                                          <p:spTgt spid="10"/>
-                                        </p:tgtEl>
-                                        <p:attrNameLst>
-                                          <p:attrName>style.visibility</p:attrName>
-                                        </p:attrNameLst>
-                                      </p:cBhvr>
-                                      <p:to>
-                                        <p:strVal val="hidden"/>
-                                      </p:to>
-                                    </p:set>
-                                  </p:childTnLst>
-                                </p:cTn>
-                              </p:par>
-                            </p:childTnLst>
-                          </p:cTn>
-                        </p:par>
-                      </p:childTnLst>
-                    </p:cTn>
-                  </p:par>
-                  <p:par>
-                    <p:cTn id="39" fill="hold">
-                      <p:stCondLst>
-                        <p:cond delay="indefinite"/>
-                      </p:stCondLst>
-                      <p:childTnLst>
-                        <p:par>
-                          <p:cTn id="40" fill="hold">
-                            <p:stCondLst>
-                              <p:cond delay="0"/>
-                            </p:stCondLst>
-                            <p:childTnLst>
-                              <p:par>
-                                <p:cTn id="41" presetID="1" presetClass="entr" presetSubtype="0" fill="hold" grpId="0" nodeType="clickEffect">
-                                  <p:stCondLst>
-                                    <p:cond delay="0"/>
-                                  </p:stCondLst>
-                                  <p:childTnLst>
-                                    <p:set>
-                                      <p:cBhvr>
-                                        <p:cTn id="42" dur="1" fill="hold">
-                                          <p:stCondLst>
-                                            <p:cond delay="0"/>
-                                          </p:stCondLst>
-                                        </p:cTn>
-                                        <p:tgtEl>
-                                          <p:spTgt spid="13"/>
-                                        </p:tgtEl>
-                                        <p:attrNameLst>
-                                          <p:attrName>style.visibility</p:attrName>
-                                        </p:attrNameLst>
-                                      </p:cBhvr>
-                                      <p:to>
-                                        <p:strVal val="visible"/>
-                                      </p:to>
-                                    </p:set>
-                                  </p:childTnLst>
-                                </p:cTn>
-                              </p:par>
-                              <p:par>
-                                <p:cTn id="43" presetID="1" presetClass="exit" presetSubtype="0" fill="hold" grpId="1" nodeType="withEffect">
-                                  <p:stCondLst>
-                                    <p:cond delay="0"/>
-                                  </p:stCondLst>
-                                  <p:childTnLst>
-                                    <p:set>
-                                      <p:cBhvr>
-                                        <p:cTn id="44" dur="1" fill="hold">
-                                          <p:stCondLst>
-                                            <p:cond delay="0"/>
-                                          </p:stCondLst>
-                                        </p:cTn>
-                                        <p:tgtEl>
-                                          <p:spTgt spid="12"/>
-                                        </p:tgtEl>
-                                        <p:attrNameLst>
-                                          <p:attrName>style.visibility</p:attrName>
-                                        </p:attrNameLst>
-                                      </p:cBhvr>
-                                      <p:to>
-                                        <p:strVal val="hidden"/>
-                                      </p:to>
-                                    </p:set>
-                                  </p:childTnLst>
-                                </p:cTn>
-                              </p:par>
-                            </p:childTnLst>
-                          </p:cTn>
-                        </p:par>
-                      </p:childTnLst>
-                    </p:cTn>
-                  </p:par>
-                  <p:par>
-                    <p:cTn id="45" fill="hold">
-                      <p:stCondLst>
-                        <p:cond delay="indefinite"/>
-                      </p:stCondLst>
-                      <p:childTnLst>
-                        <p:par>
-                          <p:cTn id="46" fill="hold">
-                            <p:stCondLst>
-                              <p:cond delay="0"/>
-                            </p:stCondLst>
-                            <p:childTnLst>
-                              <p:par>
-                                <p:cTn id="47" presetID="1" presetClass="entr" presetSubtype="0" fill="hold" grpId="2" nodeType="clickEffect">
-                                  <p:stCondLst>
-                                    <p:cond delay="0"/>
-                                  </p:stCondLst>
-                                  <p:childTnLst>
-                                    <p:set>
-                                      <p:cBhvr>
-                                        <p:cTn id="48" dur="1" fill="hold">
-                                          <p:stCondLst>
-                                            <p:cond delay="0"/>
-                                          </p:stCondLst>
-                                        </p:cTn>
-                                        <p:tgtEl>
-                                          <p:spTgt spid="7"/>
-                                        </p:tgtEl>
-                                        <p:attrNameLst>
-                                          <p:attrName>style.visibility</p:attrName>
-                                        </p:attrNameLst>
-                                      </p:cBhvr>
-                                      <p:to>
-                                        <p:strVal val="visible"/>
-                                      </p:to>
-                                    </p:set>
-                                  </p:childTnLst>
-                                </p:cTn>
-                              </p:par>
-                              <p:par>
-                                <p:cTn id="49" presetID="1" presetClass="exit" presetSubtype="0" fill="hold" grpId="1" nodeType="withEffect">
-                                  <p:stCondLst>
-                                    <p:cond delay="0"/>
-                                  </p:stCondLst>
-                                  <p:childTnLst>
-                                    <p:set>
-                                      <p:cBhvr>
-                                        <p:cTn id="50" dur="1" fill="hold">
-                                          <p:stCondLst>
-                                            <p:cond delay="0"/>
-                                          </p:stCondLst>
-                                        </p:cTn>
-                                        <p:tgtEl>
-                                          <p:spTgt spid="13"/>
-                                        </p:tgtEl>
-                                        <p:attrNameLst>
-                                          <p:attrName>style.visibility</p:attrName>
-                                        </p:attrNameLst>
-                                      </p:cBhvr>
-                                      <p:to>
-                                        <p:strVal val="hidden"/>
-                                      </p:to>
-                                    </p:set>
-                                  </p:childTnLst>
-                                </p:cTn>
-                              </p:par>
-                            </p:childTnLst>
-                          </p:cTn>
-                        </p:par>
-                      </p:childTnLst>
-                    </p:cTn>
-                  </p:par>
-                  <p:par>
-                    <p:cTn id="51" fill="hold">
-                      <p:stCondLst>
-                        <p:cond delay="indefinite"/>
-                      </p:stCondLst>
-                      <p:childTnLst>
-                        <p:par>
-                          <p:cTn id="52" fill="hold">
-                            <p:stCondLst>
-                              <p:cond delay="0"/>
-                            </p:stCondLst>
-                            <p:childTnLst>
-                              <p:par>
-                                <p:cTn id="53" presetID="1" presetClass="exit" presetSubtype="0" fill="hold" grpId="3" nodeType="clickEffect">
-                                  <p:stCondLst>
-                                    <p:cond delay="0"/>
-                                  </p:stCondLst>
-                                  <p:childTnLst>
-                                    <p:set>
-                                      <p:cBhvr>
-                                        <p:cTn id="54" dur="1" fill="hold">
-                                          <p:stCondLst>
-                                            <p:cond delay="0"/>
-                                          </p:stCondLst>
-                                        </p:cTn>
-                                        <p:tgtEl>
-                                          <p:spTgt spid="7"/>
-                                        </p:tgtEl>
-                                        <p:attrNameLst>
-                                          <p:attrName>style.visibility</p:attrName>
-                                        </p:attrNameLst>
-                                      </p:cBhvr>
-                                      <p:to>
-                                        <p:strVal val="hidden"/>
-                                      </p:to>
-                                    </p:set>
-                                  </p:childTnLst>
-                                </p:cTn>
-                              </p:par>
-                            </p:childTnLst>
-                          </p:cTn>
-                        </p:par>
-                      </p:childTnLst>
-                    </p:cTn>
-                  </p:par>
-                  <p:par>
-                    <p:cTn id="55" fill="hold">
-                      <p:stCondLst>
-                        <p:cond delay="indefinite"/>
-                      </p:stCondLst>
-                      <p:childTnLst>
-                        <p:par>
-                          <p:cTn id="56" fill="hold">
-                            <p:stCondLst>
-                              <p:cond delay="0"/>
-                            </p:stCondLst>
-                            <p:childTnLst>
-                              <p:par>
-                                <p:cTn id="57" presetID="1" presetClass="entr" presetSubtype="0" fill="hold" grpId="0" nodeType="clickEffect">
-                                  <p:stCondLst>
-                                    <p:cond delay="0"/>
-                                  </p:stCondLst>
-                                  <p:childTnLst>
-                                    <p:set>
-                                      <p:cBhvr>
-                                        <p:cTn id="58" dur="1" fill="hold">
-                                          <p:stCondLst>
-                                            <p:cond delay="0"/>
-                                          </p:stCondLst>
-                                        </p:cTn>
-                                        <p:tgtEl>
-                                          <p:spTgt spid="14"/>
-                                        </p:tgtEl>
-                                        <p:attrNameLst>
-                                          <p:attrName>style.visibility</p:attrName>
-                                        </p:attrNameLst>
-                                      </p:cBhvr>
-                                      <p:to>
-                                        <p:strVal val="visible"/>
-                                      </p:to>
-                                    </p:set>
-                                  </p:childTnLst>
-                                </p:cTn>
-                              </p:par>
-                            </p:childTnLst>
-                          </p:cTn>
-                        </p:par>
-                      </p:childTnLst>
-                    </p:cTn>
-                  </p:par>
-                  <p:par>
-                    <p:cTn id="59" fill="hold">
-                      <p:stCondLst>
-                        <p:cond delay="indefinite"/>
-                      </p:stCondLst>
-                      <p:childTnLst>
-                        <p:par>
-                          <p:cTn id="60" fill="hold">
-                            <p:stCondLst>
-                              <p:cond delay="0"/>
-                            </p:stCondLst>
-                            <p:childTnLst>
-                              <p:par>
-                                <p:cTn id="61" presetID="1" presetClass="entr" presetSubtype="0" fill="hold" grpId="0" nodeType="clickEffect">
-                                  <p:stCondLst>
-                                    <p:cond delay="0"/>
-                                  </p:stCondLst>
-                                  <p:childTnLst>
-                                    <p:set>
-                                      <p:cBhvr>
-                                        <p:cTn id="62" dur="1" fill="hold">
-                                          <p:stCondLst>
-                                            <p:cond delay="0"/>
-                                          </p:stCondLst>
-                                        </p:cTn>
-                                        <p:tgtEl>
-                                          <p:spTgt spid="15"/>
-                                        </p:tgtEl>
-                                        <p:attrNameLst>
-                                          <p:attrName>style.visibility</p:attrName>
-                                        </p:attrNameLst>
-                                      </p:cBhvr>
-                                      <p:to>
-                                        <p:strVal val="visible"/>
-                                      </p:to>
-                                    </p:set>
-                                  </p:childTnLst>
-                                </p:cTn>
-                              </p:par>
-                              <p:par>
-                                <p:cTn id="63" presetID="1" presetClass="exit" presetSubtype="0" fill="hold" grpId="1" nodeType="withEffect">
-                                  <p:stCondLst>
-                                    <p:cond delay="0"/>
-                                  </p:stCondLst>
-                                  <p:childTnLst>
-                                    <p:set>
-                                      <p:cBhvr>
-                                        <p:cTn id="64" dur="1" fill="hold">
-                                          <p:stCondLst>
-                                            <p:cond delay="0"/>
-                                          </p:stCondLst>
-                                        </p:cTn>
-                                        <p:tgtEl>
-                                          <p:spTgt spid="14"/>
-                                        </p:tgtEl>
-                                        <p:attrNameLst>
-                                          <p:attrName>style.visibility</p:attrName>
-                                        </p:attrNameLst>
-                                      </p:cBhvr>
-                                      <p:to>
-                                        <p:strVal val="hidden"/>
-                                      </p:to>
-                                    </p:set>
-                                  </p:childTnLst>
-                                </p:cTn>
-                              </p:par>
-                            </p:childTnLst>
-                          </p:cTn>
-                        </p:par>
-                      </p:childTnLst>
-                    </p:cTn>
-                  </p:par>
-                  <p:par>
-                    <p:cTn id="65" fill="hold">
-                      <p:stCondLst>
-                        <p:cond delay="indefinite"/>
-                      </p:stCondLst>
-                      <p:childTnLst>
-                        <p:par>
-                          <p:cTn id="66" fill="hold">
-                            <p:stCondLst>
-                              <p:cond delay="0"/>
-                            </p:stCondLst>
-                            <p:childTnLst>
-                              <p:par>
-                                <p:cTn id="67" presetID="1" presetClass="entr" presetSubtype="0" fill="hold" grpId="2" nodeType="clickEffect">
-                                  <p:stCondLst>
-                                    <p:cond delay="0"/>
-                                  </p:stCondLst>
-                                  <p:childTnLst>
-                                    <p:set>
-                                      <p:cBhvr>
-                                        <p:cTn id="68" dur="1" fill="hold">
-                                          <p:stCondLst>
-                                            <p:cond delay="0"/>
-                                          </p:stCondLst>
-                                        </p:cTn>
-                                        <p:tgtEl>
-                                          <p:spTgt spid="12"/>
-                                        </p:tgtEl>
-                                        <p:attrNameLst>
-                                          <p:attrName>style.visibility</p:attrName>
-                                        </p:attrNameLst>
-                                      </p:cBhvr>
-                                      <p:to>
-                                        <p:strVal val="visible"/>
-                                      </p:to>
-                                    </p:set>
-                                  </p:childTnLst>
-                                </p:cTn>
-                              </p:par>
-                              <p:par>
-                                <p:cTn id="69" presetID="1" presetClass="exit" presetSubtype="0" fill="hold" grpId="1" nodeType="withEffect">
-                                  <p:stCondLst>
-                                    <p:cond delay="0"/>
-                                  </p:stCondLst>
-                                  <p:childTnLst>
-                                    <p:set>
-                                      <p:cBhvr>
-                                        <p:cTn id="70" dur="1" fill="hold">
-                                          <p:stCondLst>
-                                            <p:cond delay="0"/>
-                                          </p:stCondLst>
-                                        </p:cTn>
-                                        <p:tgtEl>
-                                          <p:spTgt spid="15"/>
-                                        </p:tgtEl>
-                                        <p:attrNameLst>
-                                          <p:attrName>style.visibility</p:attrName>
-                                        </p:attrNameLst>
-                                      </p:cBhvr>
-                                      <p:to>
-                                        <p:strVal val="hidden"/>
-                                      </p:to>
-                                    </p:set>
-                                  </p:childTnLst>
-                                </p:cTn>
-                              </p:par>
-                            </p:childTnLst>
-                          </p:cTn>
-                        </p:par>
-                      </p:childTnLst>
-                    </p:cTn>
-                  </p:par>
-                  <p:par>
-                    <p:cTn id="71" fill="hold">
-                      <p:stCondLst>
-                        <p:cond delay="indefinite"/>
-                      </p:stCondLst>
-                      <p:childTnLst>
-                        <p:par>
-                          <p:cTn id="72" fill="hold">
-                            <p:stCondLst>
-                              <p:cond delay="0"/>
-                            </p:stCondLst>
-                            <p:childTnLst>
-                              <p:par>
-                                <p:cTn id="73" presetID="1" presetClass="entr" presetSubtype="0" fill="hold" nodeType="clickEffect">
-                                  <p:stCondLst>
-                                    <p:cond delay="0"/>
-                                  </p:stCondLst>
-                                  <p:childTnLst>
-                                    <p:set>
-                                      <p:cBhvr>
-                                        <p:cTn id="74" dur="1" fill="hold">
-                                          <p:stCondLst>
-                                            <p:cond delay="0"/>
-                                          </p:stCondLst>
-                                        </p:cTn>
-                                        <p:tgtEl>
-                                          <p:spTgt spid="4"/>
-                                        </p:tgtEl>
-                                        <p:attrNameLst>
-                                          <p:attrName>style.visibility</p:attrName>
-                                        </p:attrNameLst>
-                                      </p:cBhvr>
-                                      <p:to>
-                                        <p:strVal val="visible"/>
-                                      </p:to>
-                                    </p:set>
-                                  </p:childTnLst>
-                                </p:cTn>
-                              </p:par>
-                            </p:childTnLst>
-                          </p:cTn>
-                        </p:par>
-                      </p:childTnLst>
-                    </p:cTn>
-                  </p:par>
-                  <p:par>
-                    <p:cTn id="75" fill="hold">
-                      <p:stCondLst>
-                        <p:cond delay="indefinite"/>
-                      </p:stCondLst>
-                      <p:childTnLst>
-                        <p:par>
-                          <p:cTn id="76" fill="hold">
-                            <p:stCondLst>
-                              <p:cond delay="0"/>
-                            </p:stCondLst>
-                            <p:childTnLst>
-                              <p:par>
-                                <p:cTn id="77" presetID="1" presetClass="entr" presetSubtype="0" fill="hold" grpId="0" nodeType="clickEffect">
-                                  <p:stCondLst>
-                                    <p:cond delay="0"/>
-                                  </p:stCondLst>
-                                  <p:childTnLst>
-                                    <p:set>
-                                      <p:cBhvr>
-                                        <p:cTn id="78" dur="1" fill="hold">
-                                          <p:stCondLst>
-                                            <p:cond delay="0"/>
-                                          </p:stCondLst>
-                                        </p:cTn>
-                                        <p:tgtEl>
-                                          <p:spTgt spid="5"/>
-                                        </p:tgtEl>
-                                        <p:attrNameLst>
-                                          <p:attrName>style.visibility</p:attrName>
-                                        </p:attrNameLst>
-                                      </p:cBhvr>
-                                      <p:to>
-                                        <p:strVal val="visible"/>
-                                      </p:to>
-                                    </p:set>
-                                  </p:childTnLst>
-                                </p:cTn>
-                              </p:par>
-                            </p:childTnLst>
-                          </p:cTn>
-                        </p:par>
-                      </p:childTnLst>
-                    </p:cTn>
-                  </p:par>
-                  <p:par>
-                    <p:cTn id="79" fill="hold">
-                      <p:stCondLst>
-                        <p:cond delay="indefinite"/>
-                      </p:stCondLst>
-                      <p:childTnLst>
-                        <p:par>
-                          <p:cTn id="80" fill="hold">
-                            <p:stCondLst>
-                              <p:cond delay="0"/>
-                            </p:stCondLst>
-                            <p:childTnLst>
-                              <p:par>
-                                <p:cTn id="81" presetID="1" presetClass="entr" presetSubtype="0" fill="hold" grpId="0" nodeType="clickEffect">
-                                  <p:stCondLst>
-                                    <p:cond delay="0"/>
-                                  </p:stCondLst>
-                                  <p:childTnLst>
-                                    <p:set>
-                                      <p:cBhvr>
-                                        <p:cTn id="82" dur="1" fill="hold">
-                                          <p:stCondLst>
-                                            <p:cond delay="0"/>
-                                          </p:stCondLst>
-                                        </p:cTn>
-                                        <p:tgtEl>
-                                          <p:spTgt spid="16"/>
-                                        </p:tgtEl>
-                                        <p:attrNameLst>
-                                          <p:attrName>style.visibility</p:attrName>
-                                        </p:attrNameLst>
-                                      </p:cBhvr>
-                                      <p:to>
-                                        <p:strVal val="visible"/>
-                                      </p:to>
-                                    </p:set>
-                                  </p:childTnLst>
-                                </p:cTn>
-                              </p:par>
-                            </p:childTnLst>
-                          </p:cTn>
-                        </p:par>
-                      </p:childTnLst>
-                    </p:cTn>
-                  </p:par>
-                  <p:par>
-                    <p:cTn id="83" fill="hold">
-                      <p:stCondLst>
-                        <p:cond delay="indefinite"/>
-                      </p:stCondLst>
-                      <p:childTnLst>
-                        <p:par>
-                          <p:cTn id="84" fill="hold">
-                            <p:stCondLst>
-                              <p:cond delay="0"/>
-                            </p:stCondLst>
-                            <p:childTnLst>
-                              <p:par>
-                                <p:cTn id="85" presetID="1" presetClass="entr" presetSubtype="0" fill="hold" grpId="0" nodeType="clickEffect">
-                                  <p:stCondLst>
-                                    <p:cond delay="0"/>
-                                  </p:stCondLst>
-                                  <p:childTnLst>
-                                    <p:set>
-                                      <p:cBhvr>
-                                        <p:cTn id="86" dur="1" fill="hold">
-                                          <p:stCondLst>
-                                            <p:cond delay="0"/>
-                                          </p:stCondLst>
-                                        </p:cTn>
-                                        <p:tgtEl>
-                                          <p:spTgt spid="17"/>
-                                        </p:tgtEl>
-                                        <p:attrNameLst>
-                                          <p:attrName>style.visibility</p:attrName>
-                                        </p:attrNameLst>
-                                      </p:cBhvr>
-                                      <p:to>
-                                        <p:strVal val="visible"/>
-                                      </p:to>
-                                    </p:set>
-                                  </p:childTnLst>
-                                </p:cTn>
-                              </p:par>
-                            </p:childTnLst>
-                          </p:cTn>
-                        </p:par>
-                      </p:childTnLst>
-                    </p:cTn>
-                  </p:par>
-                </p:childTnLst>
-              </p:cTn>
-              <p:prevCondLst>
-                <p:cond evt="onPrev" delay="0">
-                  <p:tgtEl>
-                    <p:sldTgt/>
-                  </p:tgtEl>
-                </p:cond>
-              </p:prevCondLst>
-              <p:nextCondLst>
-                <p:cond evt="onNext" delay="0">
-                  <p:tgtEl>
-                    <p:sldTgt/>
-                  </p:tgtEl>
-                </p:cond>
-              </p:nextCondLst>
-            </p:seq>
-          </p:childTnLst>
-        </p:cTn>
-      </p:par>
-    </p:tnLst>
-    <p:bldLst>
-      <p:bldP spid="2" grpId="0" animBg="1"/>
-      <p:bldP spid="2" grpId="1" animBg="1"/>
-      <p:bldP spid="6" grpId="0" animBg="1"/>
-      <p:bldP spid="6" grpId="1" animBg="1"/>
-      <p:bldP spid="7" grpId="0" animBg="1"/>
-      <p:bldP spid="7" grpId="1" animBg="1"/>
-      <p:bldP spid="7" grpId="2" animBg="1"/>
-      <p:bldP spid="7" grpId="3" animBg="1"/>
-      <p:bldP spid="10" grpId="0" animBg="1"/>
-      <p:bldP spid="10" grpId="1" animBg="1"/>
-      <p:bldP spid="12" grpId="0" animBg="1"/>
-      <p:bldP spid="12" grpId="1" animBg="1"/>
-      <p:bldP spid="12" grpId="2" animBg="1"/>
-      <p:bldP spid="13" grpId="0" animBg="1"/>
-      <p:bldP spid="13" grpId="1" animBg="1"/>
-      <p:bldP spid="14" grpId="0" animBg="1"/>
-      <p:bldP spid="14" grpId="1" animBg="1"/>
-      <p:bldP spid="15" grpId="0" animBg="1"/>
-      <p:bldP spid="15" grpId="1" animBg="1"/>
-      <p:bldP spid="5" grpId="0" animBg="1"/>
-      <p:bldP spid="16" grpId="0" animBg="1"/>
-      <p:bldP spid="17" grpId="0" animBg="1"/>
-    </p:bldLst>
-  </p:timing>
 </p:sld>
 </file>
 
@@ -9925,29 +9149,80 @@
           <a:p>
             <a:r>
               <a:rPr lang="en-US" dirty="0" smtClean="0"/>
-              <a:t>Build Process</a:t>
+              <a:t>Initial User Setup</a:t>
             </a:r>
             <a:endParaRPr lang="en-US" dirty="0"/>
           </a:p>
         </p:txBody>
       </p:sp>
+      <p:sp>
+        <p:nvSpPr>
+          <p:cNvPr id="3" name="Content Placeholder 2"/>
+          <p:cNvSpPr>
+            <a:spLocks noGrp="1"/>
+          </p:cNvSpPr>
+          <p:nvPr>
+            <p:ph idx="1"/>
+          </p:nvPr>
+        </p:nvSpPr>
+        <p:spPr>
+          <a:xfrm>
+            <a:off x="470647" y="1356052"/>
+            <a:ext cx="8332694" cy="1333360"/>
+          </a:xfrm>
+        </p:spPr>
+        <p:txBody>
+          <a:bodyPr/>
+          <a:lstStyle/>
+          <a:p>
+            <a:r>
+              <a:rPr lang="en-US" dirty="0" smtClean="0"/>
+              <a:t>If Node is not paired a basic webpage will be hosted for the user to input the SSID and Password of the connection point</a:t>
+            </a:r>
+            <a:endParaRPr lang="en-US" dirty="0"/>
+          </a:p>
+        </p:txBody>
+      </p:sp>
+      <p:pic>
+        <p:nvPicPr>
+          <p:cNvPr id="4" name="Picture 3"/>
+          <p:cNvPicPr>
+            <a:picLocks noChangeAspect="1"/>
+          </p:cNvPicPr>
+          <p:nvPr/>
+        </p:nvPicPr>
+        <p:blipFill>
+          <a:blip r:embed="rId3">
+            <a:extLst>
+              <a:ext uri="{28A0092B-C50C-407E-A947-70E740481C1C}">
+                <a14:useLocalDpi xmlns:a14="http://schemas.microsoft.com/office/drawing/2010/main" val="0"/>
+              </a:ext>
+            </a:extLst>
+          </a:blip>
+          <a:stretch>
+            <a:fillRect/>
+          </a:stretch>
+        </p:blipFill>
+        <p:spPr>
+          <a:xfrm>
+            <a:off x="1546412" y="2785923"/>
+            <a:ext cx="4851400" cy="2641600"/>
+          </a:xfrm>
+          <a:prstGeom prst="rect">
+            <a:avLst/>
+          </a:prstGeom>
+        </p:spPr>
+      </p:pic>
     </p:spTree>
     <p:extLst>
       <p:ext uri="{BB962C8B-B14F-4D97-AF65-F5344CB8AC3E}">
-        <p14:creationId xmlns:p14="http://schemas.microsoft.com/office/powerpoint/2010/main" val="3881248493"/>
+        <p14:creationId xmlns:p14="http://schemas.microsoft.com/office/powerpoint/2010/main" val="392100371"/>
       </p:ext>
     </p:extLst>
   </p:cSld>
   <p:clrMapOvr>
     <a:masterClrMapping/>
   </p:clrMapOvr>
-  <p:timing>
-    <p:tnLst>
-      <p:par>
-        <p:cTn id="1" dur="indefinite" restart="never" nodeType="tmRoot"/>
-      </p:par>
-    </p:tnLst>
-  </p:timing>
 </p:sld>
 </file>
 

</xml_diff>